<commit_message>
update images in gan (#368)
* add ignore file

* update gan

* update pptx
</commit_message>
<xml_diff>
--- a/B-教学案例与实践/B15-生成对抗网络/charts.pptx
+++ b/B-教学案例与实践/B15-生成对抗网络/charts.pptx
@@ -6,7 +6,8 @@
   </p:sldMasterIdLst>
   <p:sldIdLst>
     <p:sldId id="256" r:id="rId2"/>
-    <p:sldId id="257" r:id="rId3"/>
+    <p:sldId id="258" r:id="rId3"/>
+    <p:sldId id="257" r:id="rId4"/>
   </p:sldIdLst>
   <p:sldSz cx="12192000" cy="6858000"/>
   <p:notesSz cx="6858000" cy="9144000"/>
@@ -260,7 +261,7 @@
           <a:p>
             <a:fld id="{0A1A9DB1-28CF-41DB-9607-11BEBBFA57EC}" type="datetimeFigureOut">
               <a:rPr lang="zh-CN" altLang="en-US" smtClean="0"/>
-              <a:t>2019/10/28</a:t>
+              <a:t>2019/10/30</a:t>
             </a:fld>
             <a:endParaRPr lang="zh-CN" altLang="en-US"/>
           </a:p>
@@ -458,7 +459,7 @@
           <a:p>
             <a:fld id="{0A1A9DB1-28CF-41DB-9607-11BEBBFA57EC}" type="datetimeFigureOut">
               <a:rPr lang="zh-CN" altLang="en-US" smtClean="0"/>
-              <a:t>2019/10/28</a:t>
+              <a:t>2019/10/30</a:t>
             </a:fld>
             <a:endParaRPr lang="zh-CN" altLang="en-US"/>
           </a:p>
@@ -666,7 +667,7 @@
           <a:p>
             <a:fld id="{0A1A9DB1-28CF-41DB-9607-11BEBBFA57EC}" type="datetimeFigureOut">
               <a:rPr lang="zh-CN" altLang="en-US" smtClean="0"/>
-              <a:t>2019/10/28</a:t>
+              <a:t>2019/10/30</a:t>
             </a:fld>
             <a:endParaRPr lang="zh-CN" altLang="en-US"/>
           </a:p>
@@ -864,7 +865,7 @@
           <a:p>
             <a:fld id="{0A1A9DB1-28CF-41DB-9607-11BEBBFA57EC}" type="datetimeFigureOut">
               <a:rPr lang="zh-CN" altLang="en-US" smtClean="0"/>
-              <a:t>2019/10/28</a:t>
+              <a:t>2019/10/30</a:t>
             </a:fld>
             <a:endParaRPr lang="zh-CN" altLang="en-US"/>
           </a:p>
@@ -1139,7 +1140,7 @@
           <a:p>
             <a:fld id="{0A1A9DB1-28CF-41DB-9607-11BEBBFA57EC}" type="datetimeFigureOut">
               <a:rPr lang="zh-CN" altLang="en-US" smtClean="0"/>
-              <a:t>2019/10/28</a:t>
+              <a:t>2019/10/30</a:t>
             </a:fld>
             <a:endParaRPr lang="zh-CN" altLang="en-US"/>
           </a:p>
@@ -1404,7 +1405,7 @@
           <a:p>
             <a:fld id="{0A1A9DB1-28CF-41DB-9607-11BEBBFA57EC}" type="datetimeFigureOut">
               <a:rPr lang="zh-CN" altLang="en-US" smtClean="0"/>
-              <a:t>2019/10/28</a:t>
+              <a:t>2019/10/30</a:t>
             </a:fld>
             <a:endParaRPr lang="zh-CN" altLang="en-US"/>
           </a:p>
@@ -1816,7 +1817,7 @@
           <a:p>
             <a:fld id="{0A1A9DB1-28CF-41DB-9607-11BEBBFA57EC}" type="datetimeFigureOut">
               <a:rPr lang="zh-CN" altLang="en-US" smtClean="0"/>
-              <a:t>2019/10/28</a:t>
+              <a:t>2019/10/30</a:t>
             </a:fld>
             <a:endParaRPr lang="zh-CN" altLang="en-US"/>
           </a:p>
@@ -1957,7 +1958,7 @@
           <a:p>
             <a:fld id="{0A1A9DB1-28CF-41DB-9607-11BEBBFA57EC}" type="datetimeFigureOut">
               <a:rPr lang="zh-CN" altLang="en-US" smtClean="0"/>
-              <a:t>2019/10/28</a:t>
+              <a:t>2019/10/30</a:t>
             </a:fld>
             <a:endParaRPr lang="zh-CN" altLang="en-US"/>
           </a:p>
@@ -2070,7 +2071,7 @@
           <a:p>
             <a:fld id="{0A1A9DB1-28CF-41DB-9607-11BEBBFA57EC}" type="datetimeFigureOut">
               <a:rPr lang="zh-CN" altLang="en-US" smtClean="0"/>
-              <a:t>2019/10/28</a:t>
+              <a:t>2019/10/30</a:t>
             </a:fld>
             <a:endParaRPr lang="zh-CN" altLang="en-US"/>
           </a:p>
@@ -2381,7 +2382,7 @@
           <a:p>
             <a:fld id="{0A1A9DB1-28CF-41DB-9607-11BEBBFA57EC}" type="datetimeFigureOut">
               <a:rPr lang="zh-CN" altLang="en-US" smtClean="0"/>
-              <a:t>2019/10/28</a:t>
+              <a:t>2019/10/30</a:t>
             </a:fld>
             <a:endParaRPr lang="zh-CN" altLang="en-US"/>
           </a:p>
@@ -2669,7 +2670,7 @@
           <a:p>
             <a:fld id="{0A1A9DB1-28CF-41DB-9607-11BEBBFA57EC}" type="datetimeFigureOut">
               <a:rPr lang="zh-CN" altLang="en-US" smtClean="0"/>
-              <a:t>2019/10/28</a:t>
+              <a:t>2019/10/30</a:t>
             </a:fld>
             <a:endParaRPr lang="zh-CN" altLang="en-US"/>
           </a:p>
@@ -2910,7 +2911,7 @@
           <a:p>
             <a:fld id="{0A1A9DB1-28CF-41DB-9607-11BEBBFA57EC}" type="datetimeFigureOut">
               <a:rPr lang="zh-CN" altLang="en-US" smtClean="0"/>
-              <a:t>2019/10/28</a:t>
+              <a:t>2019/10/30</a:t>
             </a:fld>
             <a:endParaRPr lang="zh-CN" altLang="en-US"/>
           </a:p>
@@ -5591,10 +5592,10 @@
       </p:grpSpPr>
       <p:sp>
         <p:nvSpPr>
-          <p:cNvPr id="2" name="矩形 1">
-            <a:extLst>
-              <a:ext uri="{FF2B5EF4-FFF2-40B4-BE49-F238E27FC236}">
-                <a16:creationId xmlns:a16="http://schemas.microsoft.com/office/drawing/2014/main" id="{8FF5DCC1-EA17-4973-964A-239A885595BD}"/>
+          <p:cNvPr id="80" name="矩形 79">
+            <a:extLst>
+              <a:ext uri="{FF2B5EF4-FFF2-40B4-BE49-F238E27FC236}">
+                <a16:creationId xmlns:a16="http://schemas.microsoft.com/office/drawing/2014/main" id="{C24BC0D2-1119-46CB-963F-1E1775657655}"/>
               </a:ext>
             </a:extLst>
           </p:cNvPr>
@@ -5603,8 +5604,8 @@
         </p:nvSpPr>
         <p:spPr>
           <a:xfrm>
-            <a:off x="1055337" y="666206"/>
-            <a:ext cx="6494325" cy="4952066"/>
+            <a:off x="1643604" y="1455630"/>
+            <a:ext cx="6840639" cy="4158092"/>
           </a:xfrm>
           <a:prstGeom prst="rect">
             <a:avLst/>
@@ -5643,10 +5644,10 @@
       </p:sp>
       <p:sp>
         <p:nvSpPr>
-          <p:cNvPr id="3" name="梯形 2">
-            <a:extLst>
-              <a:ext uri="{FF2B5EF4-FFF2-40B4-BE49-F238E27FC236}">
-                <a16:creationId xmlns:a16="http://schemas.microsoft.com/office/drawing/2014/main" id="{AB32F909-AA61-4EC0-AD32-90D68D92FFE7}"/>
+          <p:cNvPr id="4" name="梯形 3">
+            <a:extLst>
+              <a:ext uri="{FF2B5EF4-FFF2-40B4-BE49-F238E27FC236}">
+                <a16:creationId xmlns:a16="http://schemas.microsoft.com/office/drawing/2014/main" id="{2BC0D732-1E7D-4C27-8A2C-44CB0402A14A}"/>
               </a:ext>
             </a:extLst>
           </p:cNvPr>
@@ -5655,8 +5656,8 @@
         </p:nvSpPr>
         <p:spPr>
           <a:xfrm rot="16200000">
-            <a:off x="2240104" y="3815288"/>
-            <a:ext cx="1747071" cy="778551"/>
+            <a:off x="1777144" y="2526311"/>
+            <a:ext cx="2823364" cy="2280213"/>
           </a:xfrm>
           <a:prstGeom prst="trapezoid">
             <a:avLst/>
@@ -5691,10 +5692,10 @@
       </p:sp>
       <p:sp>
         <p:nvSpPr>
-          <p:cNvPr id="4" name="梯形 3">
-            <a:extLst>
-              <a:ext uri="{FF2B5EF4-FFF2-40B4-BE49-F238E27FC236}">
-                <a16:creationId xmlns:a16="http://schemas.microsoft.com/office/drawing/2014/main" id="{469BF5F2-62E0-4AAB-9293-969DDFBE101F}"/>
+          <p:cNvPr id="5" name="梯形 4">
+            <a:extLst>
+              <a:ext uri="{FF2B5EF4-FFF2-40B4-BE49-F238E27FC236}">
+                <a16:creationId xmlns:a16="http://schemas.microsoft.com/office/drawing/2014/main" id="{7A3A0E7A-A012-4B1F-8C01-0625C79C5AE3}"/>
               </a:ext>
             </a:extLst>
           </p:cNvPr>
@@ -5703,8 +5704,8 @@
         </p:nvSpPr>
         <p:spPr>
           <a:xfrm rot="5400000">
-            <a:off x="3545290" y="2591261"/>
-            <a:ext cx="4262895" cy="778550"/>
+            <a:off x="4057356" y="2526312"/>
+            <a:ext cx="2823364" cy="2280214"/>
           </a:xfrm>
           <a:prstGeom prst="trapezoid">
             <a:avLst/>
@@ -5739,6 +5740,1895 @@
       </p:sp>
       <mc:AlternateContent xmlns:mc="http://schemas.openxmlformats.org/markup-compatibility/2006">
         <mc:Choice xmlns:a14="http://schemas.microsoft.com/office/drawing/2010/main" Requires="a14">
+          <p:sp>
+            <p:nvSpPr>
+              <p:cNvPr id="8" name="文本框 7">
+                <a:extLst>
+                  <a:ext uri="{FF2B5EF4-FFF2-40B4-BE49-F238E27FC236}">
+                    <a16:creationId xmlns:a16="http://schemas.microsoft.com/office/drawing/2014/main" id="{D8F06A25-7526-43BF-97FE-F2543AB8FAD3}"/>
+                  </a:ext>
+                </a:extLst>
+              </p:cNvPr>
+              <p:cNvSpPr txBox="1"/>
+              <p:nvPr/>
+            </p:nvSpPr>
+            <p:spPr>
+              <a:xfrm>
+                <a:off x="4350383" y="2439522"/>
+                <a:ext cx="853567" cy="307777"/>
+              </a:xfrm>
+              <a:prstGeom prst="rect">
+                <a:avLst/>
+              </a:prstGeom>
+              <a:noFill/>
+            </p:spPr>
+            <p:txBody>
+              <a:bodyPr wrap="none" rtlCol="0">
+                <a:spAutoFit/>
+              </a:bodyPr>
+              <a:lstStyle/>
+              <a:p>
+                <a:r>
+                  <a:rPr lang="zh-CN" altLang="en-US" sz="1400" dirty="0">
+                    <a:solidFill>
+                      <a:schemeClr val="accent1"/>
+                    </a:solidFill>
+                  </a:rPr>
+                  <a:t>判别器</a:t>
+                </a:r>
+                <a14:m>
+                  <m:oMath xmlns:m="http://schemas.openxmlformats.org/officeDocument/2006/math">
+                    <m:r>
+                      <a:rPr lang="en-US" altLang="zh-CN" sz="1400" b="0" i="1" smtClean="0">
+                        <a:solidFill>
+                          <a:schemeClr val="accent1"/>
+                        </a:solidFill>
+                        <a:latin typeface="Cambria Math" panose="02040503050406030204" pitchFamily="18" charset="0"/>
+                      </a:rPr>
+                      <m:t>𝐷</m:t>
+                    </m:r>
+                  </m:oMath>
+                </a14:m>
+                <a:endParaRPr lang="zh-CN" altLang="en-US" sz="1400" dirty="0">
+                  <a:solidFill>
+                    <a:schemeClr val="accent1"/>
+                  </a:solidFill>
+                </a:endParaRPr>
+              </a:p>
+            </p:txBody>
+          </p:sp>
+        </mc:Choice>
+        <mc:Fallback>
+          <p:sp>
+            <p:nvSpPr>
+              <p:cNvPr id="8" name="文本框 7">
+                <a:extLst>
+                  <a:ext uri="{FF2B5EF4-FFF2-40B4-BE49-F238E27FC236}">
+                    <a16:creationId xmlns:a16="http://schemas.microsoft.com/office/drawing/2014/main" id="{D8F06A25-7526-43BF-97FE-F2543AB8FAD3}"/>
+                  </a:ext>
+                </a:extLst>
+              </p:cNvPr>
+              <p:cNvSpPr txBox="1">
+                <a:spLocks noRot="1" noChangeAspect="1" noMove="1" noResize="1" noEditPoints="1" noAdjustHandles="1" noChangeArrowheads="1" noChangeShapeType="1" noTextEdit="1"/>
+              </p:cNvSpPr>
+              <p:nvPr/>
+            </p:nvSpPr>
+            <p:spPr>
+              <a:xfrm>
+                <a:off x="4350383" y="2439522"/>
+                <a:ext cx="853567" cy="307777"/>
+              </a:xfrm>
+              <a:prstGeom prst="rect">
+                <a:avLst/>
+              </a:prstGeom>
+              <a:blipFill>
+                <a:blip r:embed="rId2"/>
+                <a:stretch>
+                  <a:fillRect l="-2143" t="-3922" b="-19608"/>
+                </a:stretch>
+              </a:blipFill>
+            </p:spPr>
+            <p:txBody>
+              <a:bodyPr/>
+              <a:lstStyle/>
+              <a:p>
+                <a:r>
+                  <a:rPr lang="zh-CN" altLang="en-US">
+                    <a:noFill/>
+                  </a:rPr>
+                  <a:t> </a:t>
+                </a:r>
+              </a:p>
+            </p:txBody>
+          </p:sp>
+        </mc:Fallback>
+      </mc:AlternateContent>
+      <mc:AlternateContent xmlns:mc="http://schemas.openxmlformats.org/markup-compatibility/2006">
+        <mc:Choice xmlns:a14="http://schemas.microsoft.com/office/drawing/2010/main" Requires="a14">
+          <p:sp>
+            <p:nvSpPr>
+              <p:cNvPr id="68" name="文本框 67">
+                <a:extLst>
+                  <a:ext uri="{FF2B5EF4-FFF2-40B4-BE49-F238E27FC236}">
+                    <a16:creationId xmlns:a16="http://schemas.microsoft.com/office/drawing/2014/main" id="{D768CB63-52B0-4025-B804-159F30DCD70F}"/>
+                  </a:ext>
+                </a:extLst>
+              </p:cNvPr>
+              <p:cNvSpPr txBox="1"/>
+              <p:nvPr/>
+            </p:nvSpPr>
+            <p:spPr>
+              <a:xfrm>
+                <a:off x="3484582" y="2443393"/>
+                <a:ext cx="844975" cy="307777"/>
+              </a:xfrm>
+              <a:prstGeom prst="rect">
+                <a:avLst/>
+              </a:prstGeom>
+              <a:noFill/>
+            </p:spPr>
+            <p:txBody>
+              <a:bodyPr wrap="none" rtlCol="0">
+                <a:spAutoFit/>
+              </a:bodyPr>
+              <a:lstStyle/>
+              <a:p>
+                <a:r>
+                  <a:rPr lang="zh-CN" altLang="en-US" sz="1400" dirty="0">
+                    <a:solidFill>
+                      <a:schemeClr val="accent1"/>
+                    </a:solidFill>
+                  </a:rPr>
+                  <a:t>生成器</a:t>
+                </a:r>
+                <a14:m>
+                  <m:oMath xmlns:m="http://schemas.openxmlformats.org/officeDocument/2006/math">
+                    <m:r>
+                      <a:rPr lang="en-US" altLang="zh-CN" sz="1400" b="0" i="1" smtClean="0">
+                        <a:solidFill>
+                          <a:schemeClr val="accent1"/>
+                        </a:solidFill>
+                        <a:latin typeface="Cambria Math" panose="02040503050406030204" pitchFamily="18" charset="0"/>
+                      </a:rPr>
+                      <m:t>𝐺</m:t>
+                    </m:r>
+                  </m:oMath>
+                </a14:m>
+                <a:endParaRPr lang="zh-CN" altLang="en-US" sz="1400" dirty="0">
+                  <a:solidFill>
+                    <a:schemeClr val="accent1"/>
+                  </a:solidFill>
+                </a:endParaRPr>
+              </a:p>
+            </p:txBody>
+          </p:sp>
+        </mc:Choice>
+        <mc:Fallback>
+          <p:sp>
+            <p:nvSpPr>
+              <p:cNvPr id="68" name="文本框 67">
+                <a:extLst>
+                  <a:ext uri="{FF2B5EF4-FFF2-40B4-BE49-F238E27FC236}">
+                    <a16:creationId xmlns:a16="http://schemas.microsoft.com/office/drawing/2014/main" id="{D768CB63-52B0-4025-B804-159F30DCD70F}"/>
+                  </a:ext>
+                </a:extLst>
+              </p:cNvPr>
+              <p:cNvSpPr txBox="1">
+                <a:spLocks noRot="1" noChangeAspect="1" noMove="1" noResize="1" noEditPoints="1" noAdjustHandles="1" noChangeArrowheads="1" noChangeShapeType="1" noTextEdit="1"/>
+              </p:cNvSpPr>
+              <p:nvPr/>
+            </p:nvSpPr>
+            <p:spPr>
+              <a:xfrm>
+                <a:off x="3484582" y="2443393"/>
+                <a:ext cx="844975" cy="307777"/>
+              </a:xfrm>
+              <a:prstGeom prst="rect">
+                <a:avLst/>
+              </a:prstGeom>
+              <a:blipFill>
+                <a:blip r:embed="rId3"/>
+                <a:stretch>
+                  <a:fillRect l="-2174" t="-4000" b="-20000"/>
+                </a:stretch>
+              </a:blipFill>
+            </p:spPr>
+            <p:txBody>
+              <a:bodyPr/>
+              <a:lstStyle/>
+              <a:p>
+                <a:r>
+                  <a:rPr lang="zh-CN" altLang="en-US">
+                    <a:noFill/>
+                  </a:rPr>
+                  <a:t> </a:t>
+                </a:r>
+              </a:p>
+            </p:txBody>
+          </p:sp>
+        </mc:Fallback>
+      </mc:AlternateContent>
+      <p:sp>
+        <p:nvSpPr>
+          <p:cNvPr id="2" name="矩形 1">
+            <a:extLst>
+              <a:ext uri="{FF2B5EF4-FFF2-40B4-BE49-F238E27FC236}">
+                <a16:creationId xmlns:a16="http://schemas.microsoft.com/office/drawing/2014/main" id="{1095B776-A09E-4480-BEB4-1D48D1611F21}"/>
+              </a:ext>
+            </a:extLst>
+          </p:cNvPr>
+          <p:cNvSpPr/>
+          <p:nvPr/>
+        </p:nvSpPr>
+        <p:spPr>
+          <a:xfrm>
+            <a:off x="2338086" y="2844616"/>
+            <a:ext cx="127324" cy="1643602"/>
+          </a:xfrm>
+          <a:prstGeom prst="rect">
+            <a:avLst/>
+          </a:prstGeom>
+        </p:spPr>
+        <p:style>
+          <a:lnRef idx="1">
+            <a:schemeClr val="accent5"/>
+          </a:lnRef>
+          <a:fillRef idx="2">
+            <a:schemeClr val="accent5"/>
+          </a:fillRef>
+          <a:effectRef idx="1">
+            <a:schemeClr val="accent5"/>
+          </a:effectRef>
+          <a:fontRef idx="minor">
+            <a:schemeClr val="dk1"/>
+          </a:fontRef>
+        </p:style>
+        <p:txBody>
+          <a:bodyPr rtlCol="0" anchor="ctr"/>
+          <a:lstStyle/>
+          <a:p>
+            <a:pPr algn="ctr"/>
+            <a:endParaRPr lang="zh-CN" altLang="en-US"/>
+          </a:p>
+        </p:txBody>
+      </p:sp>
+      <p:sp>
+        <p:nvSpPr>
+          <p:cNvPr id="50" name="矩形 49">
+            <a:extLst>
+              <a:ext uri="{FF2B5EF4-FFF2-40B4-BE49-F238E27FC236}">
+                <a16:creationId xmlns:a16="http://schemas.microsoft.com/office/drawing/2014/main" id="{4CAC4B68-A42C-4E8A-9828-C5232E08F65B}"/>
+              </a:ext>
+            </a:extLst>
+          </p:cNvPr>
+          <p:cNvSpPr/>
+          <p:nvPr/>
+        </p:nvSpPr>
+        <p:spPr>
+          <a:xfrm>
+            <a:off x="3040497" y="2840293"/>
+            <a:ext cx="127324" cy="1643602"/>
+          </a:xfrm>
+          <a:prstGeom prst="rect">
+            <a:avLst/>
+          </a:prstGeom>
+        </p:spPr>
+        <p:style>
+          <a:lnRef idx="1">
+            <a:schemeClr val="accent5"/>
+          </a:lnRef>
+          <a:fillRef idx="2">
+            <a:schemeClr val="accent5"/>
+          </a:fillRef>
+          <a:effectRef idx="1">
+            <a:schemeClr val="accent5"/>
+          </a:effectRef>
+          <a:fontRef idx="minor">
+            <a:schemeClr val="dk1"/>
+          </a:fontRef>
+        </p:style>
+        <p:txBody>
+          <a:bodyPr rtlCol="0" anchor="ctr"/>
+          <a:lstStyle/>
+          <a:p>
+            <a:pPr algn="ctr"/>
+            <a:endParaRPr lang="zh-CN" altLang="en-US"/>
+          </a:p>
+        </p:txBody>
+      </p:sp>
+      <p:sp>
+        <p:nvSpPr>
+          <p:cNvPr id="51" name="矩形 50">
+            <a:extLst>
+              <a:ext uri="{FF2B5EF4-FFF2-40B4-BE49-F238E27FC236}">
+                <a16:creationId xmlns:a16="http://schemas.microsoft.com/office/drawing/2014/main" id="{338F955E-E0D8-47BF-81F2-0FCC90C949D7}"/>
+              </a:ext>
+            </a:extLst>
+          </p:cNvPr>
+          <p:cNvSpPr/>
+          <p:nvPr/>
+        </p:nvSpPr>
+        <p:spPr>
+          <a:xfrm>
+            <a:off x="3746632" y="2840293"/>
+            <a:ext cx="127324" cy="1643602"/>
+          </a:xfrm>
+          <a:prstGeom prst="rect">
+            <a:avLst/>
+          </a:prstGeom>
+        </p:spPr>
+        <p:style>
+          <a:lnRef idx="1">
+            <a:schemeClr val="accent5"/>
+          </a:lnRef>
+          <a:fillRef idx="2">
+            <a:schemeClr val="accent5"/>
+          </a:fillRef>
+          <a:effectRef idx="1">
+            <a:schemeClr val="accent5"/>
+          </a:effectRef>
+          <a:fontRef idx="minor">
+            <a:schemeClr val="dk1"/>
+          </a:fontRef>
+        </p:style>
+        <p:txBody>
+          <a:bodyPr rtlCol="0" anchor="ctr"/>
+          <a:lstStyle/>
+          <a:p>
+            <a:pPr algn="ctr"/>
+            <a:endParaRPr lang="zh-CN" altLang="en-US"/>
+          </a:p>
+        </p:txBody>
+      </p:sp>
+      <p:sp>
+        <p:nvSpPr>
+          <p:cNvPr id="58" name="矩形 57">
+            <a:extLst>
+              <a:ext uri="{FF2B5EF4-FFF2-40B4-BE49-F238E27FC236}">
+                <a16:creationId xmlns:a16="http://schemas.microsoft.com/office/drawing/2014/main" id="{F42EF55A-DF14-48C7-BE2C-BD8EC0B6B30B}"/>
+              </a:ext>
+            </a:extLst>
+          </p:cNvPr>
+          <p:cNvSpPr/>
+          <p:nvPr/>
+        </p:nvSpPr>
+        <p:spPr>
+          <a:xfrm>
+            <a:off x="4783908" y="2848939"/>
+            <a:ext cx="127324" cy="1643602"/>
+          </a:xfrm>
+          <a:prstGeom prst="rect">
+            <a:avLst/>
+          </a:prstGeom>
+        </p:spPr>
+        <p:style>
+          <a:lnRef idx="1">
+            <a:schemeClr val="accent5"/>
+          </a:lnRef>
+          <a:fillRef idx="2">
+            <a:schemeClr val="accent5"/>
+          </a:fillRef>
+          <a:effectRef idx="1">
+            <a:schemeClr val="accent5"/>
+          </a:effectRef>
+          <a:fontRef idx="minor">
+            <a:schemeClr val="dk1"/>
+          </a:fontRef>
+        </p:style>
+        <p:txBody>
+          <a:bodyPr rtlCol="0" anchor="ctr"/>
+          <a:lstStyle/>
+          <a:p>
+            <a:pPr algn="ctr"/>
+            <a:endParaRPr lang="zh-CN" altLang="en-US"/>
+          </a:p>
+        </p:txBody>
+      </p:sp>
+      <p:sp>
+        <p:nvSpPr>
+          <p:cNvPr id="59" name="矩形 58">
+            <a:extLst>
+              <a:ext uri="{FF2B5EF4-FFF2-40B4-BE49-F238E27FC236}">
+                <a16:creationId xmlns:a16="http://schemas.microsoft.com/office/drawing/2014/main" id="{01BE1B5D-632F-491E-A2E7-300AE90CC066}"/>
+              </a:ext>
+            </a:extLst>
+          </p:cNvPr>
+          <p:cNvSpPr/>
+          <p:nvPr/>
+        </p:nvSpPr>
+        <p:spPr>
+          <a:xfrm>
+            <a:off x="5486319" y="2844616"/>
+            <a:ext cx="127324" cy="1643602"/>
+          </a:xfrm>
+          <a:prstGeom prst="rect">
+            <a:avLst/>
+          </a:prstGeom>
+        </p:spPr>
+        <p:style>
+          <a:lnRef idx="1">
+            <a:schemeClr val="accent5"/>
+          </a:lnRef>
+          <a:fillRef idx="2">
+            <a:schemeClr val="accent5"/>
+          </a:fillRef>
+          <a:effectRef idx="1">
+            <a:schemeClr val="accent5"/>
+          </a:effectRef>
+          <a:fontRef idx="minor">
+            <a:schemeClr val="dk1"/>
+          </a:fontRef>
+        </p:style>
+        <p:txBody>
+          <a:bodyPr rtlCol="0" anchor="ctr"/>
+          <a:lstStyle/>
+          <a:p>
+            <a:pPr algn="ctr"/>
+            <a:endParaRPr lang="zh-CN" altLang="en-US"/>
+          </a:p>
+        </p:txBody>
+      </p:sp>
+      <p:sp>
+        <p:nvSpPr>
+          <p:cNvPr id="60" name="矩形 59">
+            <a:extLst>
+              <a:ext uri="{FF2B5EF4-FFF2-40B4-BE49-F238E27FC236}">
+                <a16:creationId xmlns:a16="http://schemas.microsoft.com/office/drawing/2014/main" id="{A24B0B67-D9B7-4C31-9D49-CC4B1295729E}"/>
+              </a:ext>
+            </a:extLst>
+          </p:cNvPr>
+          <p:cNvSpPr/>
+          <p:nvPr/>
+        </p:nvSpPr>
+        <p:spPr>
+          <a:xfrm>
+            <a:off x="6192454" y="2844616"/>
+            <a:ext cx="127324" cy="1643602"/>
+          </a:xfrm>
+          <a:prstGeom prst="rect">
+            <a:avLst/>
+          </a:prstGeom>
+        </p:spPr>
+        <p:style>
+          <a:lnRef idx="1">
+            <a:schemeClr val="accent5"/>
+          </a:lnRef>
+          <a:fillRef idx="2">
+            <a:schemeClr val="accent5"/>
+          </a:fillRef>
+          <a:effectRef idx="1">
+            <a:schemeClr val="accent5"/>
+          </a:effectRef>
+          <a:fontRef idx="minor">
+            <a:schemeClr val="dk1"/>
+          </a:fontRef>
+        </p:style>
+        <p:txBody>
+          <a:bodyPr rtlCol="0" anchor="ctr"/>
+          <a:lstStyle/>
+          <a:p>
+            <a:pPr algn="ctr"/>
+            <a:endParaRPr lang="zh-CN" altLang="en-US"/>
+          </a:p>
+        </p:txBody>
+      </p:sp>
+      <p:cxnSp>
+        <p:nvCxnSpPr>
+          <p:cNvPr id="61" name="直接箭头连接符 60">
+            <a:extLst>
+              <a:ext uri="{FF2B5EF4-FFF2-40B4-BE49-F238E27FC236}">
+                <a16:creationId xmlns:a16="http://schemas.microsoft.com/office/drawing/2014/main" id="{6F821D85-2906-4A33-ABC1-832952564082}"/>
+              </a:ext>
+            </a:extLst>
+          </p:cNvPr>
+          <p:cNvCxnSpPr>
+            <a:cxnSpLocks/>
+          </p:cNvCxnSpPr>
+          <p:nvPr/>
+        </p:nvCxnSpPr>
+        <p:spPr>
+          <a:xfrm>
+            <a:off x="2492845" y="3659689"/>
+            <a:ext cx="547652" cy="0"/>
+          </a:xfrm>
+          <a:prstGeom prst="straightConnector1">
+            <a:avLst/>
+          </a:prstGeom>
+          <a:ln>
+            <a:tailEnd type="triangle"/>
+          </a:ln>
+        </p:spPr>
+        <p:style>
+          <a:lnRef idx="3">
+            <a:schemeClr val="accent1"/>
+          </a:lnRef>
+          <a:fillRef idx="0">
+            <a:schemeClr val="accent1"/>
+          </a:fillRef>
+          <a:effectRef idx="2">
+            <a:schemeClr val="accent1"/>
+          </a:effectRef>
+          <a:fontRef idx="minor">
+            <a:schemeClr val="tx1"/>
+          </a:fontRef>
+        </p:style>
+      </p:cxnSp>
+      <p:cxnSp>
+        <p:nvCxnSpPr>
+          <p:cNvPr id="62" name="直接箭头连接符 61">
+            <a:extLst>
+              <a:ext uri="{FF2B5EF4-FFF2-40B4-BE49-F238E27FC236}">
+                <a16:creationId xmlns:a16="http://schemas.microsoft.com/office/drawing/2014/main" id="{CEA8746E-8B98-47E7-8195-AD1C6B2232FE}"/>
+              </a:ext>
+            </a:extLst>
+          </p:cNvPr>
+          <p:cNvCxnSpPr>
+            <a:cxnSpLocks/>
+          </p:cNvCxnSpPr>
+          <p:nvPr/>
+        </p:nvCxnSpPr>
+        <p:spPr>
+          <a:xfrm>
+            <a:off x="3188826" y="3670434"/>
+            <a:ext cx="547652" cy="0"/>
+          </a:xfrm>
+          <a:prstGeom prst="straightConnector1">
+            <a:avLst/>
+          </a:prstGeom>
+          <a:ln>
+            <a:tailEnd type="triangle"/>
+          </a:ln>
+        </p:spPr>
+        <p:style>
+          <a:lnRef idx="3">
+            <a:schemeClr val="accent1"/>
+          </a:lnRef>
+          <a:fillRef idx="0">
+            <a:schemeClr val="accent1"/>
+          </a:fillRef>
+          <a:effectRef idx="2">
+            <a:schemeClr val="accent1"/>
+          </a:effectRef>
+          <a:fontRef idx="minor">
+            <a:schemeClr val="tx1"/>
+          </a:fontRef>
+        </p:style>
+      </p:cxnSp>
+      <p:cxnSp>
+        <p:nvCxnSpPr>
+          <p:cNvPr id="63" name="直接箭头连接符 62">
+            <a:extLst>
+              <a:ext uri="{FF2B5EF4-FFF2-40B4-BE49-F238E27FC236}">
+                <a16:creationId xmlns:a16="http://schemas.microsoft.com/office/drawing/2014/main" id="{3F0EAC91-DD45-4673-B0E5-5329B790FFE6}"/>
+              </a:ext>
+            </a:extLst>
+          </p:cNvPr>
+          <p:cNvCxnSpPr>
+            <a:cxnSpLocks/>
+          </p:cNvCxnSpPr>
+          <p:nvPr/>
+        </p:nvCxnSpPr>
+        <p:spPr>
+          <a:xfrm>
+            <a:off x="4911232" y="3666417"/>
+            <a:ext cx="547652" cy="0"/>
+          </a:xfrm>
+          <a:prstGeom prst="straightConnector1">
+            <a:avLst/>
+          </a:prstGeom>
+          <a:ln>
+            <a:tailEnd type="triangle"/>
+          </a:ln>
+        </p:spPr>
+        <p:style>
+          <a:lnRef idx="3">
+            <a:schemeClr val="accent1"/>
+          </a:lnRef>
+          <a:fillRef idx="0">
+            <a:schemeClr val="accent1"/>
+          </a:fillRef>
+          <a:effectRef idx="2">
+            <a:schemeClr val="accent1"/>
+          </a:effectRef>
+          <a:fontRef idx="minor">
+            <a:schemeClr val="tx1"/>
+          </a:fontRef>
+        </p:style>
+      </p:cxnSp>
+      <p:cxnSp>
+        <p:nvCxnSpPr>
+          <p:cNvPr id="64" name="直接箭头连接符 63">
+            <a:extLst>
+              <a:ext uri="{FF2B5EF4-FFF2-40B4-BE49-F238E27FC236}">
+                <a16:creationId xmlns:a16="http://schemas.microsoft.com/office/drawing/2014/main" id="{A6545A9F-516D-4181-9619-09BD0437EE82}"/>
+              </a:ext>
+            </a:extLst>
+          </p:cNvPr>
+          <p:cNvCxnSpPr>
+            <a:cxnSpLocks/>
+          </p:cNvCxnSpPr>
+          <p:nvPr/>
+        </p:nvCxnSpPr>
+        <p:spPr>
+          <a:xfrm>
+            <a:off x="5644802" y="3666417"/>
+            <a:ext cx="547652" cy="0"/>
+          </a:xfrm>
+          <a:prstGeom prst="straightConnector1">
+            <a:avLst/>
+          </a:prstGeom>
+          <a:ln>
+            <a:tailEnd type="triangle"/>
+          </a:ln>
+        </p:spPr>
+        <p:style>
+          <a:lnRef idx="3">
+            <a:schemeClr val="accent1"/>
+          </a:lnRef>
+          <a:fillRef idx="0">
+            <a:schemeClr val="accent1"/>
+          </a:fillRef>
+          <a:effectRef idx="2">
+            <a:schemeClr val="accent1"/>
+          </a:effectRef>
+          <a:fontRef idx="minor">
+            <a:schemeClr val="tx1"/>
+          </a:fontRef>
+        </p:style>
+      </p:cxnSp>
+      <p:cxnSp>
+        <p:nvCxnSpPr>
+          <p:cNvPr id="70" name="直接箭头连接符 69">
+            <a:extLst>
+              <a:ext uri="{FF2B5EF4-FFF2-40B4-BE49-F238E27FC236}">
+                <a16:creationId xmlns:a16="http://schemas.microsoft.com/office/drawing/2014/main" id="{CCF61E96-E2C4-4D92-8F83-6DEA84B6AF04}"/>
+              </a:ext>
+            </a:extLst>
+          </p:cNvPr>
+          <p:cNvCxnSpPr>
+            <a:cxnSpLocks/>
+          </p:cNvCxnSpPr>
+          <p:nvPr/>
+        </p:nvCxnSpPr>
+        <p:spPr>
+          <a:xfrm>
+            <a:off x="3873956" y="3659689"/>
+            <a:ext cx="909952" cy="6728"/>
+          </a:xfrm>
+          <a:prstGeom prst="straightConnector1">
+            <a:avLst/>
+          </a:prstGeom>
+          <a:ln>
+            <a:tailEnd type="triangle"/>
+          </a:ln>
+        </p:spPr>
+        <p:style>
+          <a:lnRef idx="3">
+            <a:schemeClr val="accent1"/>
+          </a:lnRef>
+          <a:fillRef idx="0">
+            <a:schemeClr val="accent1"/>
+          </a:fillRef>
+          <a:effectRef idx="2">
+            <a:schemeClr val="accent1"/>
+          </a:effectRef>
+          <a:fontRef idx="minor">
+            <a:schemeClr val="tx1"/>
+          </a:fontRef>
+        </p:style>
+      </p:cxnSp>
+      <p:grpSp>
+        <p:nvGrpSpPr>
+          <p:cNvPr id="116" name="组合 115">
+            <a:extLst>
+              <a:ext uri="{FF2B5EF4-FFF2-40B4-BE49-F238E27FC236}">
+                <a16:creationId xmlns:a16="http://schemas.microsoft.com/office/drawing/2014/main" id="{C2E1AAF2-6728-48A1-ABD7-7AF168AE03DE}"/>
+              </a:ext>
+            </a:extLst>
+          </p:cNvPr>
+          <p:cNvGrpSpPr/>
+          <p:nvPr/>
+        </p:nvGrpSpPr>
+        <p:grpSpPr>
+          <a:xfrm>
+            <a:off x="1863525" y="1563276"/>
+            <a:ext cx="1424555" cy="307777"/>
+            <a:chOff x="2142595" y="545632"/>
+            <a:chExt cx="1424555" cy="307777"/>
+          </a:xfrm>
+        </p:grpSpPr>
+        <p:cxnSp>
+          <p:nvCxnSpPr>
+            <p:cNvPr id="69" name="直接箭头连接符 68">
+              <a:extLst>
+                <a:ext uri="{FF2B5EF4-FFF2-40B4-BE49-F238E27FC236}">
+                  <a16:creationId xmlns:a16="http://schemas.microsoft.com/office/drawing/2014/main" id="{E0C35CBA-CD1C-477E-86EB-397D745D4D3F}"/>
+                </a:ext>
+              </a:extLst>
+            </p:cNvPr>
+            <p:cNvCxnSpPr>
+              <a:cxnSpLocks/>
+            </p:cNvCxnSpPr>
+            <p:nvPr/>
+          </p:nvCxnSpPr>
+          <p:spPr>
+            <a:xfrm>
+              <a:off x="2142595" y="699521"/>
+              <a:ext cx="547652" cy="0"/>
+            </a:xfrm>
+            <a:prstGeom prst="straightConnector1">
+              <a:avLst/>
+            </a:prstGeom>
+            <a:ln>
+              <a:tailEnd type="triangle"/>
+            </a:ln>
+          </p:spPr>
+          <p:style>
+            <a:lnRef idx="3">
+              <a:schemeClr val="accent1"/>
+            </a:lnRef>
+            <a:fillRef idx="0">
+              <a:schemeClr val="accent1"/>
+            </a:fillRef>
+            <a:effectRef idx="2">
+              <a:schemeClr val="accent1"/>
+            </a:effectRef>
+            <a:fontRef idx="minor">
+              <a:schemeClr val="tx1"/>
+            </a:fontRef>
+          </p:style>
+        </p:cxnSp>
+        <p:sp>
+          <p:nvSpPr>
+            <p:cNvPr id="71" name="文本框 70">
+              <a:extLst>
+                <a:ext uri="{FF2B5EF4-FFF2-40B4-BE49-F238E27FC236}">
+                  <a16:creationId xmlns:a16="http://schemas.microsoft.com/office/drawing/2014/main" id="{AC4F168F-0CDD-4F1A-957E-C220880E349A}"/>
+                </a:ext>
+              </a:extLst>
+            </p:cNvPr>
+            <p:cNvSpPr txBox="1"/>
+            <p:nvPr/>
+          </p:nvSpPr>
+          <p:spPr>
+            <a:xfrm>
+              <a:off x="2664339" y="545632"/>
+              <a:ext cx="902811" cy="307777"/>
+            </a:xfrm>
+            <a:prstGeom prst="rect">
+              <a:avLst/>
+            </a:prstGeom>
+            <a:noFill/>
+          </p:spPr>
+          <p:txBody>
+            <a:bodyPr wrap="none" rtlCol="0">
+              <a:spAutoFit/>
+            </a:bodyPr>
+            <a:lstStyle/>
+            <a:p>
+              <a:r>
+                <a:rPr lang="zh-CN" altLang="en-US" sz="1400" dirty="0">
+                  <a:solidFill>
+                    <a:schemeClr val="accent1"/>
+                  </a:solidFill>
+                </a:rPr>
+                <a:t>前向计算</a:t>
+              </a:r>
+            </a:p>
+          </p:txBody>
+        </p:sp>
+      </p:grpSp>
+      <p:cxnSp>
+        <p:nvCxnSpPr>
+          <p:cNvPr id="74" name="直接箭头连接符 73">
+            <a:extLst>
+              <a:ext uri="{FF2B5EF4-FFF2-40B4-BE49-F238E27FC236}">
+                <a16:creationId xmlns:a16="http://schemas.microsoft.com/office/drawing/2014/main" id="{4CDB4E2B-A39A-49B8-9E0D-33E24C9D3DE3}"/>
+              </a:ext>
+            </a:extLst>
+          </p:cNvPr>
+          <p:cNvCxnSpPr>
+            <a:cxnSpLocks/>
+          </p:cNvCxnSpPr>
+          <p:nvPr/>
+        </p:nvCxnSpPr>
+        <p:spPr>
+          <a:xfrm flipH="1">
+            <a:off x="5644802" y="3098317"/>
+            <a:ext cx="537308" cy="0"/>
+          </a:xfrm>
+          <a:prstGeom prst="straightConnector1">
+            <a:avLst/>
+          </a:prstGeom>
+          <a:ln>
+            <a:tailEnd type="triangle"/>
+          </a:ln>
+        </p:spPr>
+        <p:style>
+          <a:lnRef idx="3">
+            <a:schemeClr val="accent6"/>
+          </a:lnRef>
+          <a:fillRef idx="0">
+            <a:schemeClr val="accent6"/>
+          </a:fillRef>
+          <a:effectRef idx="2">
+            <a:schemeClr val="accent6"/>
+          </a:effectRef>
+          <a:fontRef idx="minor">
+            <a:schemeClr val="tx1"/>
+          </a:fontRef>
+        </p:style>
+      </p:cxnSp>
+      <p:cxnSp>
+        <p:nvCxnSpPr>
+          <p:cNvPr id="75" name="直接箭头连接符 74">
+            <a:extLst>
+              <a:ext uri="{FF2B5EF4-FFF2-40B4-BE49-F238E27FC236}">
+                <a16:creationId xmlns:a16="http://schemas.microsoft.com/office/drawing/2014/main" id="{134649B0-1AC5-4EC8-9971-29AFA02701AF}"/>
+              </a:ext>
+            </a:extLst>
+          </p:cNvPr>
+          <p:cNvCxnSpPr>
+            <a:cxnSpLocks/>
+          </p:cNvCxnSpPr>
+          <p:nvPr/>
+        </p:nvCxnSpPr>
+        <p:spPr>
+          <a:xfrm flipH="1">
+            <a:off x="4931730" y="3098317"/>
+            <a:ext cx="537308" cy="0"/>
+          </a:xfrm>
+          <a:prstGeom prst="straightConnector1">
+            <a:avLst/>
+          </a:prstGeom>
+          <a:ln>
+            <a:tailEnd type="triangle"/>
+          </a:ln>
+        </p:spPr>
+        <p:style>
+          <a:lnRef idx="3">
+            <a:schemeClr val="accent6"/>
+          </a:lnRef>
+          <a:fillRef idx="0">
+            <a:schemeClr val="accent6"/>
+          </a:fillRef>
+          <a:effectRef idx="2">
+            <a:schemeClr val="accent6"/>
+          </a:effectRef>
+          <a:fontRef idx="minor">
+            <a:schemeClr val="tx1"/>
+          </a:fontRef>
+        </p:style>
+      </p:cxnSp>
+      <p:cxnSp>
+        <p:nvCxnSpPr>
+          <p:cNvPr id="76" name="直接箭头连接符 75">
+            <a:extLst>
+              <a:ext uri="{FF2B5EF4-FFF2-40B4-BE49-F238E27FC236}">
+                <a16:creationId xmlns:a16="http://schemas.microsoft.com/office/drawing/2014/main" id="{83A552A0-FAAA-4CBD-99B2-F9525313E6E8}"/>
+              </a:ext>
+            </a:extLst>
+          </p:cNvPr>
+          <p:cNvCxnSpPr>
+            <a:cxnSpLocks/>
+          </p:cNvCxnSpPr>
+          <p:nvPr/>
+        </p:nvCxnSpPr>
+        <p:spPr>
+          <a:xfrm flipH="1">
+            <a:off x="2503189" y="4240512"/>
+            <a:ext cx="537308" cy="0"/>
+          </a:xfrm>
+          <a:prstGeom prst="straightConnector1">
+            <a:avLst/>
+          </a:prstGeom>
+          <a:ln>
+            <a:tailEnd type="triangle"/>
+          </a:ln>
+        </p:spPr>
+        <p:style>
+          <a:lnRef idx="3">
+            <a:schemeClr val="accent6"/>
+          </a:lnRef>
+          <a:fillRef idx="0">
+            <a:schemeClr val="accent6"/>
+          </a:fillRef>
+          <a:effectRef idx="2">
+            <a:schemeClr val="accent6"/>
+          </a:effectRef>
+          <a:fontRef idx="minor">
+            <a:schemeClr val="tx1"/>
+          </a:fontRef>
+        </p:style>
+      </p:cxnSp>
+      <p:cxnSp>
+        <p:nvCxnSpPr>
+          <p:cNvPr id="77" name="直接箭头连接符 76">
+            <a:extLst>
+              <a:ext uri="{FF2B5EF4-FFF2-40B4-BE49-F238E27FC236}">
+                <a16:creationId xmlns:a16="http://schemas.microsoft.com/office/drawing/2014/main" id="{89F8EBEE-02E3-48F6-A355-ED62B8DF4A08}"/>
+              </a:ext>
+            </a:extLst>
+          </p:cNvPr>
+          <p:cNvCxnSpPr>
+            <a:cxnSpLocks/>
+          </p:cNvCxnSpPr>
+          <p:nvPr/>
+        </p:nvCxnSpPr>
+        <p:spPr>
+          <a:xfrm flipH="1">
+            <a:off x="3188826" y="4240512"/>
+            <a:ext cx="537308" cy="0"/>
+          </a:xfrm>
+          <a:prstGeom prst="straightConnector1">
+            <a:avLst/>
+          </a:prstGeom>
+          <a:ln>
+            <a:tailEnd type="triangle"/>
+          </a:ln>
+        </p:spPr>
+        <p:style>
+          <a:lnRef idx="3">
+            <a:schemeClr val="accent6"/>
+          </a:lnRef>
+          <a:fillRef idx="0">
+            <a:schemeClr val="accent6"/>
+          </a:fillRef>
+          <a:effectRef idx="2">
+            <a:schemeClr val="accent6"/>
+          </a:effectRef>
+          <a:fontRef idx="minor">
+            <a:schemeClr val="tx1"/>
+          </a:fontRef>
+        </p:style>
+      </p:cxnSp>
+      <p:cxnSp>
+        <p:nvCxnSpPr>
+          <p:cNvPr id="78" name="直接箭头连接符 77">
+            <a:extLst>
+              <a:ext uri="{FF2B5EF4-FFF2-40B4-BE49-F238E27FC236}">
+                <a16:creationId xmlns:a16="http://schemas.microsoft.com/office/drawing/2014/main" id="{74D7DC84-7A9D-4F18-A785-9B0133F3EA57}"/>
+              </a:ext>
+            </a:extLst>
+          </p:cNvPr>
+          <p:cNvCxnSpPr>
+            <a:cxnSpLocks/>
+          </p:cNvCxnSpPr>
+          <p:nvPr/>
+        </p:nvCxnSpPr>
+        <p:spPr>
+          <a:xfrm flipH="1">
+            <a:off x="3949134" y="4240512"/>
+            <a:ext cx="834774" cy="0"/>
+          </a:xfrm>
+          <a:prstGeom prst="straightConnector1">
+            <a:avLst/>
+          </a:prstGeom>
+          <a:ln>
+            <a:tailEnd type="triangle"/>
+          </a:ln>
+        </p:spPr>
+        <p:style>
+          <a:lnRef idx="3">
+            <a:schemeClr val="accent6"/>
+          </a:lnRef>
+          <a:fillRef idx="0">
+            <a:schemeClr val="accent6"/>
+          </a:fillRef>
+          <a:effectRef idx="2">
+            <a:schemeClr val="accent6"/>
+          </a:effectRef>
+          <a:fontRef idx="minor">
+            <a:schemeClr val="tx1"/>
+          </a:fontRef>
+        </p:style>
+      </p:cxnSp>
+      <p:cxnSp>
+        <p:nvCxnSpPr>
+          <p:cNvPr id="81" name="直接箭头连接符 80">
+            <a:extLst>
+              <a:ext uri="{FF2B5EF4-FFF2-40B4-BE49-F238E27FC236}">
+                <a16:creationId xmlns:a16="http://schemas.microsoft.com/office/drawing/2014/main" id="{77CE94CA-C27B-4F8E-B4C8-C4C8594E604B}"/>
+              </a:ext>
+            </a:extLst>
+          </p:cNvPr>
+          <p:cNvCxnSpPr>
+            <a:cxnSpLocks/>
+          </p:cNvCxnSpPr>
+          <p:nvPr/>
+        </p:nvCxnSpPr>
+        <p:spPr>
+          <a:xfrm flipH="1">
+            <a:off x="4911232" y="4228778"/>
+            <a:ext cx="537308" cy="0"/>
+          </a:xfrm>
+          <a:prstGeom prst="straightConnector1">
+            <a:avLst/>
+          </a:prstGeom>
+          <a:ln>
+            <a:tailEnd type="triangle"/>
+          </a:ln>
+        </p:spPr>
+        <p:style>
+          <a:lnRef idx="3">
+            <a:schemeClr val="accent6"/>
+          </a:lnRef>
+          <a:fillRef idx="0">
+            <a:schemeClr val="accent6"/>
+          </a:fillRef>
+          <a:effectRef idx="2">
+            <a:schemeClr val="accent6"/>
+          </a:effectRef>
+          <a:fontRef idx="minor">
+            <a:schemeClr val="tx1"/>
+          </a:fontRef>
+        </p:style>
+      </p:cxnSp>
+      <p:cxnSp>
+        <p:nvCxnSpPr>
+          <p:cNvPr id="82" name="直接箭头连接符 81">
+            <a:extLst>
+              <a:ext uri="{FF2B5EF4-FFF2-40B4-BE49-F238E27FC236}">
+                <a16:creationId xmlns:a16="http://schemas.microsoft.com/office/drawing/2014/main" id="{466B2A37-EE58-407F-9169-C65B48B6C033}"/>
+              </a:ext>
+            </a:extLst>
+          </p:cNvPr>
+          <p:cNvCxnSpPr>
+            <a:cxnSpLocks/>
+          </p:cNvCxnSpPr>
+          <p:nvPr/>
+        </p:nvCxnSpPr>
+        <p:spPr>
+          <a:xfrm flipH="1">
+            <a:off x="5644802" y="4228778"/>
+            <a:ext cx="537308" cy="0"/>
+          </a:xfrm>
+          <a:prstGeom prst="straightConnector1">
+            <a:avLst/>
+          </a:prstGeom>
+          <a:ln>
+            <a:tailEnd type="triangle"/>
+          </a:ln>
+        </p:spPr>
+        <p:style>
+          <a:lnRef idx="3">
+            <a:schemeClr val="accent6"/>
+          </a:lnRef>
+          <a:fillRef idx="0">
+            <a:schemeClr val="accent6"/>
+          </a:fillRef>
+          <a:effectRef idx="2">
+            <a:schemeClr val="accent6"/>
+          </a:effectRef>
+          <a:fontRef idx="minor">
+            <a:schemeClr val="tx1"/>
+          </a:fontRef>
+        </p:style>
+      </p:cxnSp>
+      <p:grpSp>
+        <p:nvGrpSpPr>
+          <p:cNvPr id="118" name="组合 117">
+            <a:extLst>
+              <a:ext uri="{FF2B5EF4-FFF2-40B4-BE49-F238E27FC236}">
+                <a16:creationId xmlns:a16="http://schemas.microsoft.com/office/drawing/2014/main" id="{F3AA340B-500A-4337-9BC4-F81496651D84}"/>
+              </a:ext>
+            </a:extLst>
+          </p:cNvPr>
+          <p:cNvGrpSpPr/>
+          <p:nvPr/>
+        </p:nvGrpSpPr>
+        <p:grpSpPr>
+          <a:xfrm>
+            <a:off x="3800220" y="1579702"/>
+            <a:ext cx="1424555" cy="307777"/>
+            <a:chOff x="2142595" y="825352"/>
+            <a:chExt cx="1424555" cy="307777"/>
+          </a:xfrm>
+        </p:grpSpPr>
+        <p:cxnSp>
+          <p:nvCxnSpPr>
+            <p:cNvPr id="72" name="直接箭头连接符 71">
+              <a:extLst>
+                <a:ext uri="{FF2B5EF4-FFF2-40B4-BE49-F238E27FC236}">
+                  <a16:creationId xmlns:a16="http://schemas.microsoft.com/office/drawing/2014/main" id="{0E279D3C-BF31-46B5-B560-EAB0EC898139}"/>
+                </a:ext>
+              </a:extLst>
+            </p:cNvPr>
+            <p:cNvCxnSpPr>
+              <a:cxnSpLocks/>
+            </p:cNvCxnSpPr>
+            <p:nvPr/>
+          </p:nvCxnSpPr>
+          <p:spPr>
+            <a:xfrm flipH="1">
+              <a:off x="2142595" y="979241"/>
+              <a:ext cx="537308" cy="0"/>
+            </a:xfrm>
+            <a:prstGeom prst="straightConnector1">
+              <a:avLst/>
+            </a:prstGeom>
+            <a:ln>
+              <a:tailEnd type="triangle"/>
+            </a:ln>
+          </p:spPr>
+          <p:style>
+            <a:lnRef idx="3">
+              <a:schemeClr val="accent6"/>
+            </a:lnRef>
+            <a:fillRef idx="0">
+              <a:schemeClr val="accent6"/>
+            </a:fillRef>
+            <a:effectRef idx="2">
+              <a:schemeClr val="accent6"/>
+            </a:effectRef>
+            <a:fontRef idx="minor">
+              <a:schemeClr val="tx1"/>
+            </a:fontRef>
+          </p:style>
+        </p:cxnSp>
+        <p:sp>
+          <p:nvSpPr>
+            <p:cNvPr id="83" name="文本框 82">
+              <a:extLst>
+                <a:ext uri="{FF2B5EF4-FFF2-40B4-BE49-F238E27FC236}">
+                  <a16:creationId xmlns:a16="http://schemas.microsoft.com/office/drawing/2014/main" id="{1B3A6434-3746-414A-9F3E-86E872917311}"/>
+                </a:ext>
+              </a:extLst>
+            </p:cNvPr>
+            <p:cNvSpPr txBox="1"/>
+            <p:nvPr/>
+          </p:nvSpPr>
+          <p:spPr>
+            <a:xfrm>
+              <a:off x="2664339" y="825352"/>
+              <a:ext cx="902811" cy="307777"/>
+            </a:xfrm>
+            <a:prstGeom prst="rect">
+              <a:avLst/>
+            </a:prstGeom>
+            <a:noFill/>
+          </p:spPr>
+          <p:txBody>
+            <a:bodyPr wrap="none" rtlCol="0">
+              <a:spAutoFit/>
+            </a:bodyPr>
+            <a:lstStyle/>
+            <a:p>
+              <a:r>
+                <a:rPr lang="zh-CN" altLang="en-US" sz="1400" dirty="0">
+                  <a:solidFill>
+                    <a:schemeClr val="accent1"/>
+                  </a:solidFill>
+                </a:rPr>
+                <a:t>反向传播</a:t>
+              </a:r>
+            </a:p>
+          </p:txBody>
+        </p:sp>
+      </p:grpSp>
+      <p:sp>
+        <p:nvSpPr>
+          <p:cNvPr id="20" name="矩形 19">
+            <a:extLst>
+              <a:ext uri="{FF2B5EF4-FFF2-40B4-BE49-F238E27FC236}">
+                <a16:creationId xmlns:a16="http://schemas.microsoft.com/office/drawing/2014/main" id="{30B234DF-269D-4BFA-9C29-2DF2872A3BAF}"/>
+              </a:ext>
+            </a:extLst>
+          </p:cNvPr>
+          <p:cNvSpPr/>
+          <p:nvPr/>
+        </p:nvSpPr>
+        <p:spPr>
+          <a:xfrm>
+            <a:off x="1863523" y="1922758"/>
+            <a:ext cx="6350761" cy="1431484"/>
+          </a:xfrm>
+          <a:prstGeom prst="rect">
+            <a:avLst/>
+          </a:prstGeom>
+          <a:noFill/>
+          <a:ln w="9525" cap="flat" cmpd="sng" algn="ctr">
+            <a:solidFill>
+              <a:schemeClr val="accent5"/>
+            </a:solidFill>
+            <a:prstDash val="dash"/>
+            <a:round/>
+            <a:headEnd type="none" w="med" len="med"/>
+            <a:tailEnd type="none" w="med" len="med"/>
+          </a:ln>
+        </p:spPr>
+        <p:style>
+          <a:lnRef idx="0">
+            <a:scrgbClr r="0" g="0" b="0"/>
+          </a:lnRef>
+          <a:fillRef idx="0">
+            <a:scrgbClr r="0" g="0" b="0"/>
+          </a:fillRef>
+          <a:effectRef idx="0">
+            <a:scrgbClr r="0" g="0" b="0"/>
+          </a:effectRef>
+          <a:fontRef idx="minor">
+            <a:schemeClr val="accent5"/>
+          </a:fontRef>
+        </p:style>
+        <p:txBody>
+          <a:bodyPr rtlCol="0" anchor="ctr"/>
+          <a:lstStyle/>
+          <a:p>
+            <a:pPr algn="ctr"/>
+            <a:endParaRPr lang="zh-CN" altLang="en-US"/>
+          </a:p>
+        </p:txBody>
+      </p:sp>
+      <p:sp>
+        <p:nvSpPr>
+          <p:cNvPr id="84" name="矩形 83">
+            <a:extLst>
+              <a:ext uri="{FF2B5EF4-FFF2-40B4-BE49-F238E27FC236}">
+                <a16:creationId xmlns:a16="http://schemas.microsoft.com/office/drawing/2014/main" id="{84EDA828-22E0-4666-B884-D0BC5074194E}"/>
+              </a:ext>
+            </a:extLst>
+          </p:cNvPr>
+          <p:cNvSpPr/>
+          <p:nvPr/>
+        </p:nvSpPr>
+        <p:spPr>
+          <a:xfrm>
+            <a:off x="1837195" y="3938505"/>
+            <a:ext cx="6377089" cy="1463865"/>
+          </a:xfrm>
+          <a:prstGeom prst="rect">
+            <a:avLst/>
+          </a:prstGeom>
+          <a:noFill/>
+          <a:ln w="9525" cap="flat" cmpd="sng" algn="ctr">
+            <a:solidFill>
+              <a:schemeClr val="accent5"/>
+            </a:solidFill>
+            <a:prstDash val="dash"/>
+            <a:round/>
+            <a:headEnd type="none" w="med" len="med"/>
+            <a:tailEnd type="none" w="med" len="med"/>
+          </a:ln>
+        </p:spPr>
+        <p:style>
+          <a:lnRef idx="0">
+            <a:scrgbClr r="0" g="0" b="0"/>
+          </a:lnRef>
+          <a:fillRef idx="0">
+            <a:scrgbClr r="0" g="0" b="0"/>
+          </a:fillRef>
+          <a:effectRef idx="0">
+            <a:scrgbClr r="0" g="0" b="0"/>
+          </a:effectRef>
+          <a:fontRef idx="minor">
+            <a:schemeClr val="accent5"/>
+          </a:fontRef>
+        </p:style>
+        <p:txBody>
+          <a:bodyPr rtlCol="0" anchor="ctr"/>
+          <a:lstStyle/>
+          <a:p>
+            <a:pPr algn="ctr"/>
+            <a:endParaRPr lang="zh-CN" altLang="en-US"/>
+          </a:p>
+        </p:txBody>
+      </p:sp>
+      <p:pic>
+        <p:nvPicPr>
+          <p:cNvPr id="26" name="图形 25" descr="重复">
+            <a:extLst>
+              <a:ext uri="{FF2B5EF4-FFF2-40B4-BE49-F238E27FC236}">
+                <a16:creationId xmlns:a16="http://schemas.microsoft.com/office/drawing/2014/main" id="{70F50624-EAA6-4A52-A009-F4CC1644D177}"/>
+              </a:ext>
+            </a:extLst>
+          </p:cNvPr>
+          <p:cNvPicPr>
+            <a:picLocks noChangeAspect="1"/>
+          </p:cNvPicPr>
+          <p:nvPr/>
+        </p:nvPicPr>
+        <p:blipFill>
+          <a:blip r:embed="rId4">
+            <a:extLst>
+              <a:ext uri="{28A0092B-C50C-407E-A947-70E740481C1C}">
+                <a14:useLocalDpi xmlns:a14="http://schemas.microsoft.com/office/drawing/2010/main" val="0"/>
+              </a:ext>
+              <a:ext uri="{96DAC541-7B7A-43D3-8B79-37D633B846F1}">
+                <asvg:svgBlip xmlns:asvg="http://schemas.microsoft.com/office/drawing/2016/SVG/main" r:embed="rId5"/>
+              </a:ext>
+            </a:extLst>
+          </a:blip>
+          <a:stretch>
+            <a:fillRect/>
+          </a:stretch>
+        </p:blipFill>
+        <p:spPr>
+          <a:xfrm>
+            <a:off x="5417618" y="2958191"/>
+            <a:ext cx="285213" cy="285213"/>
+          </a:xfrm>
+          <a:prstGeom prst="rect">
+            <a:avLst/>
+          </a:prstGeom>
+        </p:spPr>
+      </p:pic>
+      <p:pic>
+        <p:nvPicPr>
+          <p:cNvPr id="85" name="图形 84" descr="重复">
+            <a:extLst>
+              <a:ext uri="{FF2B5EF4-FFF2-40B4-BE49-F238E27FC236}">
+                <a16:creationId xmlns:a16="http://schemas.microsoft.com/office/drawing/2014/main" id="{DE918AC1-648C-483A-9BF7-23DFA9E6F7B2}"/>
+              </a:ext>
+            </a:extLst>
+          </p:cNvPr>
+          <p:cNvPicPr>
+            <a:picLocks noChangeAspect="1"/>
+          </p:cNvPicPr>
+          <p:nvPr/>
+        </p:nvPicPr>
+        <p:blipFill>
+          <a:blip r:embed="rId4">
+            <a:extLst>
+              <a:ext uri="{28A0092B-C50C-407E-A947-70E740481C1C}">
+                <a14:useLocalDpi xmlns:a14="http://schemas.microsoft.com/office/drawing/2010/main" val="0"/>
+              </a:ext>
+              <a:ext uri="{96DAC541-7B7A-43D3-8B79-37D633B846F1}">
+                <asvg:svgBlip xmlns:asvg="http://schemas.microsoft.com/office/drawing/2016/SVG/main" r:embed="rId5"/>
+              </a:ext>
+            </a:extLst>
+          </a:blip>
+          <a:stretch>
+            <a:fillRect/>
+          </a:stretch>
+        </p:blipFill>
+        <p:spPr>
+          <a:xfrm>
+            <a:off x="4700393" y="2963427"/>
+            <a:ext cx="285213" cy="285213"/>
+          </a:xfrm>
+          <a:prstGeom prst="rect">
+            <a:avLst/>
+          </a:prstGeom>
+        </p:spPr>
+      </p:pic>
+      <p:pic>
+        <p:nvPicPr>
+          <p:cNvPr id="86" name="图形 85" descr="重复">
+            <a:extLst>
+              <a:ext uri="{FF2B5EF4-FFF2-40B4-BE49-F238E27FC236}">
+                <a16:creationId xmlns:a16="http://schemas.microsoft.com/office/drawing/2014/main" id="{4D32EB61-E33D-4D9D-BD38-65C6C872880B}"/>
+              </a:ext>
+            </a:extLst>
+          </p:cNvPr>
+          <p:cNvPicPr>
+            <a:picLocks noChangeAspect="1"/>
+          </p:cNvPicPr>
+          <p:nvPr/>
+        </p:nvPicPr>
+        <p:blipFill>
+          <a:blip r:embed="rId4">
+            <a:extLst>
+              <a:ext uri="{28A0092B-C50C-407E-A947-70E740481C1C}">
+                <a14:useLocalDpi xmlns:a14="http://schemas.microsoft.com/office/drawing/2010/main" val="0"/>
+              </a:ext>
+              <a:ext uri="{96DAC541-7B7A-43D3-8B79-37D633B846F1}">
+                <asvg:svgBlip xmlns:asvg="http://schemas.microsoft.com/office/drawing/2016/SVG/main" r:embed="rId5"/>
+              </a:ext>
+            </a:extLst>
+          </a:blip>
+          <a:stretch>
+            <a:fillRect/>
+          </a:stretch>
+        </p:blipFill>
+        <p:spPr>
+          <a:xfrm>
+            <a:off x="6130690" y="2937588"/>
+            <a:ext cx="285213" cy="285213"/>
+          </a:xfrm>
+          <a:prstGeom prst="rect">
+            <a:avLst/>
+          </a:prstGeom>
+        </p:spPr>
+      </p:pic>
+      <p:pic>
+        <p:nvPicPr>
+          <p:cNvPr id="87" name="图形 86" descr="重复">
+            <a:extLst>
+              <a:ext uri="{FF2B5EF4-FFF2-40B4-BE49-F238E27FC236}">
+                <a16:creationId xmlns:a16="http://schemas.microsoft.com/office/drawing/2014/main" id="{AB4C2570-3FBC-4F73-B624-D6CE0450D394}"/>
+              </a:ext>
+            </a:extLst>
+          </p:cNvPr>
+          <p:cNvPicPr>
+            <a:picLocks noChangeAspect="1"/>
+          </p:cNvPicPr>
+          <p:nvPr/>
+        </p:nvPicPr>
+        <p:blipFill>
+          <a:blip r:embed="rId4">
+            <a:extLst>
+              <a:ext uri="{28A0092B-C50C-407E-A947-70E740481C1C}">
+                <a14:useLocalDpi xmlns:a14="http://schemas.microsoft.com/office/drawing/2010/main" val="0"/>
+              </a:ext>
+              <a:ext uri="{96DAC541-7B7A-43D3-8B79-37D633B846F1}">
+                <asvg:svgBlip xmlns:asvg="http://schemas.microsoft.com/office/drawing/2016/SVG/main" r:embed="rId5"/>
+              </a:ext>
+            </a:extLst>
+          </a:blip>
+          <a:stretch>
+            <a:fillRect/>
+          </a:stretch>
+        </p:blipFill>
+        <p:spPr>
+          <a:xfrm>
+            <a:off x="2966833" y="4107584"/>
+            <a:ext cx="285213" cy="285213"/>
+          </a:xfrm>
+          <a:prstGeom prst="rect">
+            <a:avLst/>
+          </a:prstGeom>
+        </p:spPr>
+      </p:pic>
+      <p:pic>
+        <p:nvPicPr>
+          <p:cNvPr id="88" name="图形 87" descr="重复">
+            <a:extLst>
+              <a:ext uri="{FF2B5EF4-FFF2-40B4-BE49-F238E27FC236}">
+                <a16:creationId xmlns:a16="http://schemas.microsoft.com/office/drawing/2014/main" id="{70E41331-C502-4885-BD79-A071556023DE}"/>
+              </a:ext>
+            </a:extLst>
+          </p:cNvPr>
+          <p:cNvPicPr>
+            <a:picLocks noChangeAspect="1"/>
+          </p:cNvPicPr>
+          <p:nvPr/>
+        </p:nvPicPr>
+        <p:blipFill>
+          <a:blip r:embed="rId4">
+            <a:extLst>
+              <a:ext uri="{28A0092B-C50C-407E-A947-70E740481C1C}">
+                <a14:useLocalDpi xmlns:a14="http://schemas.microsoft.com/office/drawing/2010/main" val="0"/>
+              </a:ext>
+              <a:ext uri="{96DAC541-7B7A-43D3-8B79-37D633B846F1}">
+                <asvg:svgBlip xmlns:asvg="http://schemas.microsoft.com/office/drawing/2016/SVG/main" r:embed="rId5"/>
+              </a:ext>
+            </a:extLst>
+          </a:blip>
+          <a:stretch>
+            <a:fillRect/>
+          </a:stretch>
+        </p:blipFill>
+        <p:spPr>
+          <a:xfrm>
+            <a:off x="2249608" y="4112820"/>
+            <a:ext cx="285213" cy="285213"/>
+          </a:xfrm>
+          <a:prstGeom prst="rect">
+            <a:avLst/>
+          </a:prstGeom>
+        </p:spPr>
+      </p:pic>
+      <p:pic>
+        <p:nvPicPr>
+          <p:cNvPr id="89" name="图形 88" descr="重复">
+            <a:extLst>
+              <a:ext uri="{FF2B5EF4-FFF2-40B4-BE49-F238E27FC236}">
+                <a16:creationId xmlns:a16="http://schemas.microsoft.com/office/drawing/2014/main" id="{C3218792-E7C0-45E2-B7B0-ABAAF4D87799}"/>
+              </a:ext>
+            </a:extLst>
+          </p:cNvPr>
+          <p:cNvPicPr>
+            <a:picLocks noChangeAspect="1"/>
+          </p:cNvPicPr>
+          <p:nvPr/>
+        </p:nvPicPr>
+        <p:blipFill>
+          <a:blip r:embed="rId4">
+            <a:extLst>
+              <a:ext uri="{28A0092B-C50C-407E-A947-70E740481C1C}">
+                <a14:useLocalDpi xmlns:a14="http://schemas.microsoft.com/office/drawing/2010/main" val="0"/>
+              </a:ext>
+              <a:ext uri="{96DAC541-7B7A-43D3-8B79-37D633B846F1}">
+                <asvg:svgBlip xmlns:asvg="http://schemas.microsoft.com/office/drawing/2016/SVG/main" r:embed="rId5"/>
+              </a:ext>
+            </a:extLst>
+          </a:blip>
+          <a:stretch>
+            <a:fillRect/>
+          </a:stretch>
+        </p:blipFill>
+        <p:spPr>
+          <a:xfrm>
+            <a:off x="3679905" y="4086981"/>
+            <a:ext cx="285213" cy="285213"/>
+          </a:xfrm>
+          <a:prstGeom prst="rect">
+            <a:avLst/>
+          </a:prstGeom>
+        </p:spPr>
+      </p:pic>
+      <p:sp>
+        <p:nvSpPr>
+          <p:cNvPr id="92" name="文本框 91">
+            <a:extLst>
+              <a:ext uri="{FF2B5EF4-FFF2-40B4-BE49-F238E27FC236}">
+                <a16:creationId xmlns:a16="http://schemas.microsoft.com/office/drawing/2014/main" id="{804F3B8F-6BD3-4B26-A747-E1E675565BCC}"/>
+              </a:ext>
+            </a:extLst>
+          </p:cNvPr>
+          <p:cNvSpPr txBox="1"/>
+          <p:nvPr/>
+        </p:nvSpPr>
+        <p:spPr>
+          <a:xfrm>
+            <a:off x="4933449" y="1997126"/>
+            <a:ext cx="3280835" cy="523220"/>
+          </a:xfrm>
+          <a:prstGeom prst="rect">
+            <a:avLst/>
+          </a:prstGeom>
+          <a:noFill/>
+        </p:spPr>
+        <p:txBody>
+          <a:bodyPr wrap="none" rtlCol="0">
+            <a:spAutoFit/>
+          </a:bodyPr>
+          <a:lstStyle/>
+          <a:p>
+            <a:pPr algn="ctr"/>
+            <a:r>
+              <a:rPr lang="zh-CN" altLang="en-US" sz="1400" dirty="0">
+                <a:solidFill>
+                  <a:schemeClr val="accent1"/>
+                </a:solidFill>
+              </a:rPr>
+              <a:t>训练判别器时，反向传播判别器中各层</a:t>
+            </a:r>
+          </a:p>
+          <a:p>
+            <a:pPr algn="ctr"/>
+            <a:r>
+              <a:rPr lang="zh-CN" altLang="en-US" sz="1400" dirty="0">
+                <a:solidFill>
+                  <a:schemeClr val="accent1"/>
+                </a:solidFill>
+              </a:rPr>
+              <a:t>同时判别器中各层计算梯度并更新</a:t>
+            </a:r>
+          </a:p>
+        </p:txBody>
+      </p:sp>
+      <p:sp>
+        <p:nvSpPr>
+          <p:cNvPr id="93" name="文本框 92">
+            <a:extLst>
+              <a:ext uri="{FF2B5EF4-FFF2-40B4-BE49-F238E27FC236}">
+                <a16:creationId xmlns:a16="http://schemas.microsoft.com/office/drawing/2014/main" id="{0C8EEC71-7829-46E3-9CAC-2CC30C565515}"/>
+              </a:ext>
+            </a:extLst>
+          </p:cNvPr>
+          <p:cNvSpPr txBox="1"/>
+          <p:nvPr/>
+        </p:nvSpPr>
+        <p:spPr>
+          <a:xfrm>
+            <a:off x="5024309" y="4818513"/>
+            <a:ext cx="3145413" cy="523220"/>
+          </a:xfrm>
+          <a:prstGeom prst="rect">
+            <a:avLst/>
+          </a:prstGeom>
+          <a:noFill/>
+        </p:spPr>
+        <p:txBody>
+          <a:bodyPr wrap="none" rtlCol="0">
+            <a:spAutoFit/>
+          </a:bodyPr>
+          <a:lstStyle/>
+          <a:p>
+            <a:pPr algn="ctr"/>
+            <a:r>
+              <a:rPr lang="zh-CN" altLang="en-US" sz="1400" dirty="0">
+                <a:solidFill>
+                  <a:schemeClr val="accent1"/>
+                </a:solidFill>
+              </a:rPr>
+              <a:t>训练生成器时，反向传播所有层</a:t>
+            </a:r>
+          </a:p>
+          <a:p>
+            <a:pPr algn="ctr"/>
+            <a:r>
+              <a:rPr lang="zh-CN" altLang="en-US" sz="1400" dirty="0">
+                <a:solidFill>
+                  <a:schemeClr val="accent1"/>
+                </a:solidFill>
+              </a:rPr>
+              <a:t>但只有生成器中各层计算梯度并更新</a:t>
+            </a:r>
+          </a:p>
+        </p:txBody>
+      </p:sp>
+      <p:grpSp>
+        <p:nvGrpSpPr>
+          <p:cNvPr id="117" name="组合 116">
+            <a:extLst>
+              <a:ext uri="{FF2B5EF4-FFF2-40B4-BE49-F238E27FC236}">
+                <a16:creationId xmlns:a16="http://schemas.microsoft.com/office/drawing/2014/main" id="{B2A35230-96DA-465F-92C0-EFF01596745C}"/>
+              </a:ext>
+            </a:extLst>
+          </p:cNvPr>
+          <p:cNvGrpSpPr/>
+          <p:nvPr/>
+        </p:nvGrpSpPr>
+        <p:grpSpPr>
+          <a:xfrm>
+            <a:off x="5913456" y="1557908"/>
+            <a:ext cx="1721368" cy="307777"/>
+            <a:chOff x="2384390" y="1105807"/>
+            <a:chExt cx="1721368" cy="307777"/>
+          </a:xfrm>
+        </p:grpSpPr>
+        <p:pic>
+          <p:nvPicPr>
+            <p:cNvPr id="114" name="图形 113" descr="重复">
+              <a:extLst>
+                <a:ext uri="{FF2B5EF4-FFF2-40B4-BE49-F238E27FC236}">
+                  <a16:creationId xmlns:a16="http://schemas.microsoft.com/office/drawing/2014/main" id="{F86D7B7D-0A80-40C3-BC30-CB288C57C901}"/>
+                </a:ext>
+              </a:extLst>
+            </p:cNvPr>
+            <p:cNvPicPr>
+              <a:picLocks noChangeAspect="1"/>
+            </p:cNvPicPr>
+            <p:nvPr/>
+          </p:nvPicPr>
+          <p:blipFill>
+            <a:blip r:embed="rId4">
+              <a:extLst>
+                <a:ext uri="{28A0092B-C50C-407E-A947-70E740481C1C}">
+                  <a14:useLocalDpi xmlns:a14="http://schemas.microsoft.com/office/drawing/2010/main" val="0"/>
+                </a:ext>
+                <a:ext uri="{96DAC541-7B7A-43D3-8B79-37D633B846F1}">
+                  <asvg:svgBlip xmlns:asvg="http://schemas.microsoft.com/office/drawing/2016/SVG/main" r:embed="rId5"/>
+                </a:ext>
+              </a:extLst>
+            </a:blip>
+            <a:stretch>
+              <a:fillRect/>
+            </a:stretch>
+          </p:blipFill>
+          <p:spPr>
+            <a:xfrm>
+              <a:off x="2384390" y="1108784"/>
+              <a:ext cx="285213" cy="285213"/>
+            </a:xfrm>
+            <a:prstGeom prst="rect">
+              <a:avLst/>
+            </a:prstGeom>
+          </p:spPr>
+        </p:pic>
+        <p:sp>
+          <p:nvSpPr>
+            <p:cNvPr id="115" name="文本框 114">
+              <a:extLst>
+                <a:ext uri="{FF2B5EF4-FFF2-40B4-BE49-F238E27FC236}">
+                  <a16:creationId xmlns:a16="http://schemas.microsoft.com/office/drawing/2014/main" id="{51D104E9-25E6-4579-86D5-1609DB86CBC3}"/>
+                </a:ext>
+              </a:extLst>
+            </p:cNvPr>
+            <p:cNvSpPr txBox="1"/>
+            <p:nvPr/>
+          </p:nvSpPr>
+          <p:spPr>
+            <a:xfrm>
+              <a:off x="2664338" y="1105807"/>
+              <a:ext cx="1441420" cy="307777"/>
+            </a:xfrm>
+            <a:prstGeom prst="rect">
+              <a:avLst/>
+            </a:prstGeom>
+            <a:noFill/>
+          </p:spPr>
+          <p:txBody>
+            <a:bodyPr wrap="none" rtlCol="0">
+              <a:spAutoFit/>
+            </a:bodyPr>
+            <a:lstStyle/>
+            <a:p>
+              <a:r>
+                <a:rPr lang="zh-CN" altLang="en-US" sz="1400" dirty="0">
+                  <a:solidFill>
+                    <a:schemeClr val="accent1"/>
+                  </a:solidFill>
+                </a:rPr>
+                <a:t>计算梯度并更新</a:t>
+              </a:r>
+            </a:p>
+          </p:txBody>
+        </p:sp>
+      </p:grpSp>
+    </p:spTree>
+    <p:extLst>
+      <p:ext uri="{BB962C8B-B14F-4D97-AF65-F5344CB8AC3E}">
+        <p14:creationId xmlns:p14="http://schemas.microsoft.com/office/powerpoint/2010/main" val="739996891"/>
+      </p:ext>
+    </p:extLst>
+  </p:cSld>
+  <p:clrMapOvr>
+    <a:masterClrMapping/>
+  </p:clrMapOvr>
+</p:sld>
+</file>
+
+<file path=ppt/slides/slide3.xml><?xml version="1.0" encoding="utf-8"?>
+<p:sld xmlns:a="http://schemas.openxmlformats.org/drawingml/2006/main" xmlns:r="http://schemas.openxmlformats.org/officeDocument/2006/relationships" xmlns:p="http://schemas.openxmlformats.org/presentationml/2006/main">
+  <p:cSld>
+    <p:spTree>
+      <p:nvGrpSpPr>
+        <p:cNvPr id="1" name=""/>
+        <p:cNvGrpSpPr/>
+        <p:nvPr/>
+      </p:nvGrpSpPr>
+      <p:grpSpPr>
+        <a:xfrm>
+          <a:off x="0" y="0"/>
+          <a:ext cx="0" cy="0"/>
+          <a:chOff x="0" y="0"/>
+          <a:chExt cx="0" cy="0"/>
+        </a:xfrm>
+      </p:grpSpPr>
+      <p:sp>
+        <p:nvSpPr>
+          <p:cNvPr id="2" name="矩形 1">
+            <a:extLst>
+              <a:ext uri="{FF2B5EF4-FFF2-40B4-BE49-F238E27FC236}">
+                <a16:creationId xmlns:a16="http://schemas.microsoft.com/office/drawing/2014/main" id="{8FF5DCC1-EA17-4973-964A-239A885595BD}"/>
+              </a:ext>
+            </a:extLst>
+          </p:cNvPr>
+          <p:cNvSpPr/>
+          <p:nvPr/>
+        </p:nvSpPr>
+        <p:spPr>
+          <a:xfrm>
+            <a:off x="1055337" y="666206"/>
+            <a:ext cx="6873321" cy="4952066"/>
+          </a:xfrm>
+          <a:prstGeom prst="rect">
+            <a:avLst/>
+          </a:prstGeom>
+          <a:solidFill>
+            <a:schemeClr val="bg1"/>
+          </a:solidFill>
+          <a:ln>
+            <a:solidFill>
+              <a:schemeClr val="bg1"/>
+            </a:solidFill>
+          </a:ln>
+        </p:spPr>
+        <p:style>
+          <a:lnRef idx="2">
+            <a:schemeClr val="accent4"/>
+          </a:lnRef>
+          <a:fillRef idx="1">
+            <a:schemeClr val="lt1"/>
+          </a:fillRef>
+          <a:effectRef idx="0">
+            <a:schemeClr val="accent4"/>
+          </a:effectRef>
+          <a:fontRef idx="minor">
+            <a:schemeClr val="dk1"/>
+          </a:fontRef>
+        </p:style>
+        <p:txBody>
+          <a:bodyPr rtlCol="0" anchor="ctr"/>
+          <a:lstStyle/>
+          <a:p>
+            <a:pPr algn="ctr"/>
+            <a:endParaRPr lang="zh-CN" altLang="en-US"/>
+          </a:p>
+        </p:txBody>
+      </p:sp>
+      <p:sp>
+        <p:nvSpPr>
+          <p:cNvPr id="3" name="梯形 2">
+            <a:extLst>
+              <a:ext uri="{FF2B5EF4-FFF2-40B4-BE49-F238E27FC236}">
+                <a16:creationId xmlns:a16="http://schemas.microsoft.com/office/drawing/2014/main" id="{AB32F909-AA61-4EC0-AD32-90D68D92FFE7}"/>
+              </a:ext>
+            </a:extLst>
+          </p:cNvPr>
+          <p:cNvSpPr/>
+          <p:nvPr/>
+        </p:nvSpPr>
+        <p:spPr>
+          <a:xfrm rot="16200000">
+            <a:off x="2240104" y="3815288"/>
+            <a:ext cx="1747071" cy="778551"/>
+          </a:xfrm>
+          <a:prstGeom prst="trapezoid">
+            <a:avLst/>
+          </a:prstGeom>
+        </p:spPr>
+        <p:style>
+          <a:lnRef idx="1">
+            <a:schemeClr val="accent2"/>
+          </a:lnRef>
+          <a:fillRef idx="2">
+            <a:schemeClr val="accent2"/>
+          </a:fillRef>
+          <a:effectRef idx="1">
+            <a:schemeClr val="accent2"/>
+          </a:effectRef>
+          <a:fontRef idx="minor">
+            <a:schemeClr val="dk1"/>
+          </a:fontRef>
+        </p:style>
+        <p:txBody>
+          <a:bodyPr rtlCol="0" anchor="ctr"/>
+          <a:lstStyle/>
+          <a:p>
+            <a:pPr algn="ctr"/>
+            <a:endParaRPr lang="zh-CN" altLang="en-US" sz="1400" dirty="0">
+              <a:solidFill>
+                <a:schemeClr val="accent1"/>
+              </a:solidFill>
+            </a:endParaRPr>
+          </a:p>
+        </p:txBody>
+      </p:sp>
+      <p:sp>
+        <p:nvSpPr>
+          <p:cNvPr id="4" name="梯形 3">
+            <a:extLst>
+              <a:ext uri="{FF2B5EF4-FFF2-40B4-BE49-F238E27FC236}">
+                <a16:creationId xmlns:a16="http://schemas.microsoft.com/office/drawing/2014/main" id="{469BF5F2-62E0-4AAB-9293-969DDFBE101F}"/>
+              </a:ext>
+            </a:extLst>
+          </p:cNvPr>
+          <p:cNvSpPr/>
+          <p:nvPr/>
+        </p:nvSpPr>
+        <p:spPr>
+          <a:xfrm rot="5400000">
+            <a:off x="3545290" y="2591261"/>
+            <a:ext cx="4262895" cy="778550"/>
+          </a:xfrm>
+          <a:prstGeom prst="trapezoid">
+            <a:avLst/>
+          </a:prstGeom>
+        </p:spPr>
+        <p:style>
+          <a:lnRef idx="1">
+            <a:schemeClr val="accent2"/>
+          </a:lnRef>
+          <a:fillRef idx="2">
+            <a:schemeClr val="accent2"/>
+          </a:fillRef>
+          <a:effectRef idx="1">
+            <a:schemeClr val="accent2"/>
+          </a:effectRef>
+          <a:fontRef idx="minor">
+            <a:schemeClr val="dk1"/>
+          </a:fontRef>
+        </p:style>
+        <p:txBody>
+          <a:bodyPr rtlCol="0" anchor="ctr"/>
+          <a:lstStyle/>
+          <a:p>
+            <a:pPr algn="ctr"/>
+            <a:endParaRPr lang="zh-CN" altLang="en-US" sz="1400">
+              <a:solidFill>
+                <a:schemeClr val="accent1"/>
+              </a:solidFill>
+            </a:endParaRPr>
+          </a:p>
+        </p:txBody>
+      </p:sp>
+      <mc:AlternateContent xmlns:mc="http://schemas.openxmlformats.org/markup-compatibility/2006" xmlns:a14="http://schemas.microsoft.com/office/drawing/2010/main">
+        <mc:Choice Requires="a14">
           <p:sp>
             <p:nvSpPr>
               <p:cNvPr id="5" name="文本框 4">
@@ -5797,7 +7687,7 @@
             </p:txBody>
           </p:sp>
         </mc:Choice>
-        <mc:Fallback>
+        <mc:Fallback xmlns="">
           <p:sp>
             <p:nvSpPr>
               <p:cNvPr id="5" name="文本框 4">
@@ -5842,8 +7732,8 @@
           </p:sp>
         </mc:Fallback>
       </mc:AlternateContent>
-      <mc:AlternateContent xmlns:mc="http://schemas.openxmlformats.org/markup-compatibility/2006">
-        <mc:Choice xmlns:a14="http://schemas.microsoft.com/office/drawing/2010/main" Requires="a14">
+      <mc:AlternateContent xmlns:mc="http://schemas.openxmlformats.org/markup-compatibility/2006" xmlns:a14="http://schemas.microsoft.com/office/drawing/2010/main">
+        <mc:Choice Requires="a14">
           <p:sp>
             <p:nvSpPr>
               <p:cNvPr id="6" name="文本框 5">
@@ -5902,7 +7792,7 @@
             </p:txBody>
           </p:sp>
         </mc:Choice>
-        <mc:Fallback>
+        <mc:Fallback xmlns="">
           <p:sp>
             <p:nvSpPr>
               <p:cNvPr id="6" name="文本框 5">
@@ -5961,7 +7851,7 @@
         </p:nvSpPr>
         <p:spPr>
           <a:xfrm>
-            <a:off x="1384320" y="1511866"/>
+            <a:off x="1384320" y="1465566"/>
             <a:ext cx="1060704" cy="758952"/>
           </a:xfrm>
           <a:prstGeom prst="flowChartMultidocument">
@@ -6009,7 +7899,7 @@
         </p:nvSpPr>
         <p:spPr>
           <a:xfrm>
-            <a:off x="1642504" y="1189838"/>
+            <a:off x="1642504" y="1143538"/>
             <a:ext cx="723275" cy="307777"/>
           </a:xfrm>
           <a:prstGeom prst="rect">
@@ -6048,7 +7938,7 @@
         </p:nvSpPr>
         <p:spPr>
           <a:xfrm>
-            <a:off x="3927575" y="1511866"/>
+            <a:off x="3927575" y="1465566"/>
             <a:ext cx="914400" cy="612648"/>
           </a:xfrm>
           <a:prstGeom prst="flowChartDocument">
@@ -6144,7 +8034,7 @@
         </p:nvSpPr>
         <p:spPr>
           <a:xfrm>
-            <a:off x="6510926" y="1481464"/>
+            <a:off x="6510926" y="1400439"/>
             <a:ext cx="914400" cy="612648"/>
           </a:xfrm>
           <a:prstGeom prst="flowChartDocument">
@@ -6192,7 +8082,7 @@
         </p:nvSpPr>
         <p:spPr>
           <a:xfrm>
-            <a:off x="6510926" y="4103560"/>
+            <a:off x="6510926" y="4149860"/>
             <a:ext cx="914400" cy="612648"/>
           </a:xfrm>
           <a:prstGeom prst="flowChartDocument">
@@ -6240,7 +8130,7 @@
         </p:nvSpPr>
         <p:spPr>
           <a:xfrm>
-            <a:off x="6765036" y="1481464"/>
+            <a:off x="6765036" y="1400439"/>
             <a:ext cx="543739" cy="523220"/>
           </a:xfrm>
           <a:prstGeom prst="rect">
@@ -7053,7 +8943,7 @@
         </p:nvCxnSpPr>
         <p:spPr>
           <a:xfrm>
-            <a:off x="2581468" y="1787788"/>
+            <a:off x="2581468" y="1741488"/>
             <a:ext cx="1346107" cy="0"/>
           </a:xfrm>
           <a:prstGeom prst="straightConnector1">
@@ -7089,13 +8979,12 @@
           </p:cNvPr>
           <p:cNvCxnSpPr>
             <a:cxnSpLocks/>
-            <a:endCxn id="12" idx="1"/>
           </p:cNvCxnSpPr>
           <p:nvPr/>
         </p:nvCxnSpPr>
         <p:spPr>
           <a:xfrm>
-            <a:off x="6096000" y="4409884"/>
+            <a:off x="6096000" y="4421459"/>
             <a:ext cx="414926" cy="0"/>
           </a:xfrm>
           <a:prstGeom prst="straightConnector1">
@@ -7136,7 +9025,7 @@
         </p:nvCxnSpPr>
         <p:spPr>
           <a:xfrm>
-            <a:off x="6096000" y="1765760"/>
+            <a:off x="6096000" y="1719460"/>
             <a:ext cx="414926" cy="0"/>
           </a:xfrm>
           <a:prstGeom prst="straightConnector1">
@@ -7218,7 +9107,7 @@
         </p:nvCxnSpPr>
         <p:spPr>
           <a:xfrm>
-            <a:off x="4860019" y="1787787"/>
+            <a:off x="4860019" y="1741487"/>
             <a:ext cx="427444" cy="0"/>
           </a:xfrm>
           <a:prstGeom prst="straightConnector1">
@@ -7339,7 +9228,7 @@
         </p:nvSpPr>
         <p:spPr>
           <a:xfrm>
-            <a:off x="2581468" y="1426178"/>
+            <a:off x="2581468" y="1379878"/>
             <a:ext cx="1261884" cy="307777"/>
           </a:xfrm>
           <a:prstGeom prst="rect">
@@ -7380,7 +9269,7 @@
             </p:nvSpPr>
             <p:spPr>
               <a:xfrm>
-                <a:off x="4023137" y="1056846"/>
+                <a:off x="4023137" y="1010546"/>
                 <a:ext cx="723275" cy="523220"/>
               </a:xfrm>
               <a:prstGeom prst="rect">
@@ -7454,7 +9343,7 @@
             </p:nvSpPr>
             <p:spPr>
               <a:xfrm>
-                <a:off x="4023137" y="1056846"/>
+                <a:off x="4023137" y="1010546"/>
                 <a:ext cx="723275" cy="523220"/>
               </a:xfrm>
               <a:prstGeom prst="rect">
@@ -7463,7 +9352,7 @@
               <a:blipFill>
                 <a:blip r:embed="rId4"/>
                 <a:stretch>
-                  <a:fillRect l="-2521" t="-1163" r="-840"/>
+                  <a:fillRect l="-2521" t="-2326" r="-840"/>
                 </a:stretch>
               </a:blipFill>
             </p:spPr>
@@ -7482,8 +9371,8 @@
           </p:sp>
         </mc:Fallback>
       </mc:AlternateContent>
-      <mc:AlternateContent xmlns:mc="http://schemas.openxmlformats.org/markup-compatibility/2006">
-        <mc:Choice xmlns:a14="http://schemas.microsoft.com/office/drawing/2010/main" Requires="a14">
+      <mc:AlternateContent xmlns:mc="http://schemas.openxmlformats.org/markup-compatibility/2006" xmlns:a14="http://schemas.microsoft.com/office/drawing/2010/main">
+        <mc:Choice Requires="a14">
           <p:sp>
             <p:nvSpPr>
               <p:cNvPr id="40" name="文本框 39">
@@ -7635,7 +9524,7 @@
             </p:txBody>
           </p:sp>
         </mc:Choice>
-        <mc:Fallback>
+        <mc:Fallback xmlns="">
           <p:sp>
             <p:nvSpPr>
               <p:cNvPr id="40" name="文本框 39">
@@ -7680,8 +9569,8 @@
           </p:sp>
         </mc:Fallback>
       </mc:AlternateContent>
-      <mc:AlternateContent xmlns:mc="http://schemas.openxmlformats.org/markup-compatibility/2006">
-        <mc:Choice xmlns:a14="http://schemas.microsoft.com/office/drawing/2010/main" Requires="a14">
+      <mc:AlternateContent xmlns:mc="http://schemas.openxmlformats.org/markup-compatibility/2006" xmlns:a14="http://schemas.microsoft.com/office/drawing/2010/main">
+        <mc:Choice Requires="a14">
           <p:sp>
             <p:nvSpPr>
               <p:cNvPr id="41" name="文本框 40">
@@ -7740,7 +9629,7 @@
             </p:txBody>
           </p:sp>
         </mc:Choice>
-        <mc:Fallback>
+        <mc:Fallback xmlns="">
           <p:sp>
             <p:nvSpPr>
               <p:cNvPr id="41" name="文本框 40">
@@ -7799,7 +9688,7 @@
         </p:nvSpPr>
         <p:spPr>
           <a:xfrm>
-            <a:off x="6752745" y="4114835"/>
+            <a:off x="6752745" y="4161135"/>
             <a:ext cx="543739" cy="523220"/>
           </a:xfrm>
           <a:prstGeom prst="rect">
@@ -7839,8 +9728,8 @@
           </a:p>
         </p:txBody>
       </p:sp>
-      <mc:AlternateContent xmlns:mc="http://schemas.openxmlformats.org/markup-compatibility/2006">
-        <mc:Choice xmlns:a14="http://schemas.microsoft.com/office/drawing/2010/main" Requires="a14">
+      <mc:AlternateContent xmlns:mc="http://schemas.openxmlformats.org/markup-compatibility/2006" xmlns:a14="http://schemas.microsoft.com/office/drawing/2010/main">
+        <mc:Choice Requires="a14">
           <p:sp>
             <p:nvSpPr>
               <p:cNvPr id="43" name="文本框 42">
@@ -7908,17 +9797,7 @@
                           </a:solidFill>
                           <a:latin typeface="Cambria Math" panose="02040503050406030204" pitchFamily="18" charset="0"/>
                         </a:rPr>
-                        <m:t>=[⋯, 1</m:t>
-                      </m:r>
-                      <m:r>
-                        <a:rPr lang="en-US" altLang="zh-CN" sz="1400" b="0" i="1" smtClean="0">
-                          <a:solidFill>
-                            <a:schemeClr val="accent1"/>
-                          </a:solidFill>
-                          <a:latin typeface="Cambria Math" panose="02040503050406030204" pitchFamily="18" charset="0"/>
-                          <a:ea typeface="Cambria Math" panose="02040503050406030204" pitchFamily="18" charset="0"/>
-                        </a:rPr>
-                        <m:t>, ⋯]</m:t>
+                        <m:t>=[⋯, 1, ⋯]</m:t>
                       </m:r>
                     </m:oMath>
                   </m:oMathPara>
@@ -7932,7 +9811,7 @@
             </p:txBody>
           </p:sp>
         </mc:Choice>
-        <mc:Fallback>
+        <mc:Fallback xmlns="">
           <p:sp>
             <p:nvSpPr>
               <p:cNvPr id="43" name="文本框 42">
@@ -8100,6 +9979,310 @@
           <a:p>
             <a:pPr algn="ctr"/>
             <a:endParaRPr lang="zh-CN" altLang="en-US"/>
+          </a:p>
+        </p:txBody>
+      </p:sp>
+      <p:pic>
+        <p:nvPicPr>
+          <p:cNvPr id="48" name="图片 47" descr="图片包含 游戏机, 星星, 仪表, 花&#10;&#10;描述已自动生成">
+            <a:extLst>
+              <a:ext uri="{FF2B5EF4-FFF2-40B4-BE49-F238E27FC236}">
+                <a16:creationId xmlns:a16="http://schemas.microsoft.com/office/drawing/2014/main" id="{F81E2321-D930-4C5A-8C5C-3B8FE4B6EABD}"/>
+              </a:ext>
+            </a:extLst>
+          </p:cNvPr>
+          <p:cNvPicPr>
+            <a:picLocks noChangeAspect="1"/>
+          </p:cNvPicPr>
+          <p:nvPr/>
+        </p:nvPicPr>
+        <p:blipFill>
+          <a:blip r:embed="rId8">
+            <a:extLst>
+              <a:ext uri="{28A0092B-C50C-407E-A947-70E740481C1C}">
+                <a14:useLocalDpi xmlns:a14="http://schemas.microsoft.com/office/drawing/2010/main" val="0"/>
+              </a:ext>
+            </a:extLst>
+          </a:blip>
+          <a:stretch>
+            <a:fillRect/>
+          </a:stretch>
+        </p:blipFill>
+        <p:spPr>
+          <a:xfrm>
+            <a:off x="6629604" y="2994001"/>
+            <a:ext cx="476316" cy="476316"/>
+          </a:xfrm>
+          <a:prstGeom prst="rect">
+            <a:avLst/>
+          </a:prstGeom>
+        </p:spPr>
+      </p:pic>
+      <p:pic>
+        <p:nvPicPr>
+          <p:cNvPr id="50" name="图片 49" descr="图片包含 游戏机, 星星, 画&#10;&#10;描述已自动生成">
+            <a:extLst>
+              <a:ext uri="{FF2B5EF4-FFF2-40B4-BE49-F238E27FC236}">
+                <a16:creationId xmlns:a16="http://schemas.microsoft.com/office/drawing/2014/main" id="{16D9B3B7-7EB8-4126-9F8A-B41852EA9451}"/>
+              </a:ext>
+            </a:extLst>
+          </p:cNvPr>
+          <p:cNvPicPr>
+            <a:picLocks noChangeAspect="1"/>
+          </p:cNvPicPr>
+          <p:nvPr/>
+        </p:nvPicPr>
+        <p:blipFill>
+          <a:blip r:embed="rId9">
+            <a:extLst>
+              <a:ext uri="{28A0092B-C50C-407E-A947-70E740481C1C}">
+                <a14:useLocalDpi xmlns:a14="http://schemas.microsoft.com/office/drawing/2010/main" val="0"/>
+              </a:ext>
+            </a:extLst>
+          </a:blip>
+          <a:stretch>
+            <a:fillRect/>
+          </a:stretch>
+        </p:blipFill>
+        <p:spPr>
+          <a:xfrm>
+            <a:off x="6629604" y="3585756"/>
+            <a:ext cx="476316" cy="476316"/>
+          </a:xfrm>
+          <a:prstGeom prst="rect">
+            <a:avLst/>
+          </a:prstGeom>
+        </p:spPr>
+      </p:pic>
+      <p:pic>
+        <p:nvPicPr>
+          <p:cNvPr id="52" name="图片 51" descr="图片包含 游戏机&#10;&#10;描述已自动生成">
+            <a:extLst>
+              <a:ext uri="{FF2B5EF4-FFF2-40B4-BE49-F238E27FC236}">
+                <a16:creationId xmlns:a16="http://schemas.microsoft.com/office/drawing/2014/main" id="{48697839-5667-491C-AF88-74F634724DAB}"/>
+              </a:ext>
+            </a:extLst>
+          </p:cNvPr>
+          <p:cNvPicPr>
+            <a:picLocks noChangeAspect="1"/>
+          </p:cNvPicPr>
+          <p:nvPr/>
+        </p:nvPicPr>
+        <p:blipFill>
+          <a:blip r:embed="rId10">
+            <a:extLst>
+              <a:ext uri="{28A0092B-C50C-407E-A947-70E740481C1C}">
+                <a14:useLocalDpi xmlns:a14="http://schemas.microsoft.com/office/drawing/2010/main" val="0"/>
+              </a:ext>
+            </a:extLst>
+          </a:blip>
+          <a:stretch>
+            <a:fillRect/>
+          </a:stretch>
+        </p:blipFill>
+        <p:spPr>
+          <a:xfrm>
+            <a:off x="6629604" y="2402246"/>
+            <a:ext cx="476316" cy="476316"/>
+          </a:xfrm>
+          <a:prstGeom prst="rect">
+            <a:avLst/>
+          </a:prstGeom>
+        </p:spPr>
+      </p:pic>
+      <p:sp>
+        <p:nvSpPr>
+          <p:cNvPr id="53" name="文本框 52">
+            <a:extLst>
+              <a:ext uri="{FF2B5EF4-FFF2-40B4-BE49-F238E27FC236}">
+                <a16:creationId xmlns:a16="http://schemas.microsoft.com/office/drawing/2014/main" id="{D9AC95AD-C2D4-4098-8A63-B4C39C84DB20}"/>
+              </a:ext>
+            </a:extLst>
+          </p:cNvPr>
+          <p:cNvSpPr txBox="1"/>
+          <p:nvPr/>
+        </p:nvSpPr>
+        <p:spPr>
+          <a:xfrm>
+            <a:off x="6303601" y="2039548"/>
+            <a:ext cx="1535998" cy="307777"/>
+          </a:xfrm>
+          <a:prstGeom prst="rect">
+            <a:avLst/>
+          </a:prstGeom>
+          <a:noFill/>
+        </p:spPr>
+        <p:txBody>
+          <a:bodyPr wrap="none" rtlCol="0">
+            <a:spAutoFit/>
+          </a:bodyPr>
+          <a:lstStyle/>
+          <a:p>
+            <a:r>
+              <a:rPr lang="zh-CN" altLang="en-US" sz="1400" dirty="0">
+                <a:solidFill>
+                  <a:schemeClr val="accent1"/>
+                </a:solidFill>
+              </a:rPr>
+              <a:t>当指定数字</a:t>
+            </a:r>
+            <a:r>
+              <a:rPr lang="en-US" altLang="zh-CN" sz="1400" dirty="0">
+                <a:solidFill>
+                  <a:schemeClr val="accent1"/>
+                </a:solidFill>
+              </a:rPr>
+              <a:t>3</a:t>
+            </a:r>
+            <a:r>
+              <a:rPr lang="zh-CN" altLang="en-US" sz="1400" dirty="0">
+                <a:solidFill>
+                  <a:schemeClr val="accent1"/>
+                </a:solidFill>
+              </a:rPr>
+              <a:t>时：</a:t>
+            </a:r>
+          </a:p>
+        </p:txBody>
+      </p:sp>
+      <p:sp>
+        <p:nvSpPr>
+          <p:cNvPr id="54" name="文本框 53">
+            <a:extLst>
+              <a:ext uri="{FF2B5EF4-FFF2-40B4-BE49-F238E27FC236}">
+                <a16:creationId xmlns:a16="http://schemas.microsoft.com/office/drawing/2014/main" id="{869AA5A0-B632-470A-BFE2-202FABF031AD}"/>
+              </a:ext>
+            </a:extLst>
+          </p:cNvPr>
+          <p:cNvSpPr txBox="1"/>
+          <p:nvPr/>
+        </p:nvSpPr>
+        <p:spPr>
+          <a:xfrm>
+            <a:off x="6188082" y="2465390"/>
+            <a:ext cx="1564852" cy="307777"/>
+          </a:xfrm>
+          <a:prstGeom prst="rect">
+            <a:avLst/>
+          </a:prstGeom>
+          <a:noFill/>
+        </p:spPr>
+        <p:txBody>
+          <a:bodyPr wrap="none" rtlCol="0">
+            <a:spAutoFit/>
+          </a:bodyPr>
+          <a:lstStyle/>
+          <a:p>
+            <a:r>
+              <a:rPr lang="en-US" altLang="zh-CN" sz="1400" dirty="0">
+                <a:solidFill>
+                  <a:schemeClr val="accent1"/>
+                </a:solidFill>
+              </a:rPr>
+              <a:t>3 +             =&gt; </a:t>
+            </a:r>
+            <a:r>
+              <a:rPr lang="zh-CN" altLang="en-US" sz="1400" dirty="0">
+                <a:solidFill>
+                  <a:schemeClr val="accent1"/>
+                </a:solidFill>
+              </a:rPr>
+              <a:t>假</a:t>
+            </a:r>
+          </a:p>
+        </p:txBody>
+      </p:sp>
+      <p:sp>
+        <p:nvSpPr>
+          <p:cNvPr id="56" name="文本框 55">
+            <a:extLst>
+              <a:ext uri="{FF2B5EF4-FFF2-40B4-BE49-F238E27FC236}">
+                <a16:creationId xmlns:a16="http://schemas.microsoft.com/office/drawing/2014/main" id="{9992B99D-1770-42C9-86C2-1721F1726935}"/>
+              </a:ext>
+            </a:extLst>
+          </p:cNvPr>
+          <p:cNvSpPr txBox="1"/>
+          <p:nvPr/>
+        </p:nvSpPr>
+        <p:spPr>
+          <a:xfrm>
+            <a:off x="6188082" y="3060688"/>
+            <a:ext cx="1564852" cy="307777"/>
+          </a:xfrm>
+          <a:prstGeom prst="rect">
+            <a:avLst/>
+          </a:prstGeom>
+          <a:noFill/>
+        </p:spPr>
+        <p:txBody>
+          <a:bodyPr wrap="none" rtlCol="0">
+            <a:spAutoFit/>
+          </a:bodyPr>
+          <a:lstStyle/>
+          <a:p>
+            <a:r>
+              <a:rPr lang="en-US" altLang="zh-CN" sz="1400" dirty="0">
+                <a:solidFill>
+                  <a:schemeClr val="accent1"/>
+                </a:solidFill>
+              </a:rPr>
+              <a:t>3 +             =&gt; </a:t>
+            </a:r>
+            <a:r>
+              <a:rPr lang="zh-CN" altLang="en-US" sz="1400" dirty="0">
+                <a:solidFill>
+                  <a:schemeClr val="accent1"/>
+                </a:solidFill>
+              </a:rPr>
+              <a:t>假</a:t>
+            </a:r>
+          </a:p>
+        </p:txBody>
+      </p:sp>
+      <p:sp>
+        <p:nvSpPr>
+          <p:cNvPr id="58" name="文本框 57">
+            <a:extLst>
+              <a:ext uri="{FF2B5EF4-FFF2-40B4-BE49-F238E27FC236}">
+                <a16:creationId xmlns:a16="http://schemas.microsoft.com/office/drawing/2014/main" id="{778FF21B-6142-46A5-9DFD-E1199C1D157F}"/>
+              </a:ext>
+            </a:extLst>
+          </p:cNvPr>
+          <p:cNvSpPr txBox="1"/>
+          <p:nvPr/>
+        </p:nvSpPr>
+        <p:spPr>
+          <a:xfrm>
+            <a:off x="6188082" y="3652443"/>
+            <a:ext cx="1564852" cy="307777"/>
+          </a:xfrm>
+          <a:prstGeom prst="rect">
+            <a:avLst/>
+          </a:prstGeom>
+          <a:noFill/>
+        </p:spPr>
+        <p:txBody>
+          <a:bodyPr wrap="none" rtlCol="0">
+            <a:spAutoFit/>
+          </a:bodyPr>
+          <a:lstStyle/>
+          <a:p>
+            <a:r>
+              <a:rPr lang="en-US" altLang="zh-CN" sz="1400" dirty="0">
+                <a:solidFill>
+                  <a:schemeClr val="accent1"/>
+                </a:solidFill>
+              </a:rPr>
+              <a:t>3 +             =&gt; </a:t>
+            </a:r>
+            <a:r>
+              <a:rPr lang="zh-CN" altLang="en-US" sz="1400" dirty="0">
+                <a:solidFill>
+                  <a:schemeClr val="accent1"/>
+                </a:solidFill>
+              </a:rPr>
+              <a:t>真</a:t>
+            </a:r>
           </a:p>
         </p:txBody>
       </p:sp>

</xml_diff>